<commit_message>
Changed SLR HO and Slides
</commit_message>
<xml_diff>
--- a/modules/SLRegression/PPT.pptx
+++ b/modules/SLRegression/PPT.pptx
@@ -3616,6 +3616,30 @@
           <a:chExt cx="0" cy="0"/>
         </a:xfrm>
       </p:grpSpPr>
+      <p:pic>
+        <p:nvPicPr>
+          <p:cNvPr id="3" name="Picture 2"/>
+          <p:cNvPicPr>
+            <a:picLocks noChangeAspect="1"/>
+          </p:cNvPicPr>
+          <p:nvPr/>
+        </p:nvPicPr>
+        <p:blipFill>
+          <a:blip r:embed="rId2"/>
+          <a:stretch>
+            <a:fillRect/>
+          </a:stretch>
+        </p:blipFill>
+        <p:spPr>
+          <a:xfrm>
+            <a:off x="2362200" y="2286000"/>
+            <a:ext cx="4114800" cy="4114800"/>
+          </a:xfrm>
+          <a:prstGeom prst="rect">
+            <a:avLst/>
+          </a:prstGeom>
+        </p:spPr>
+      </p:pic>
       <p:sp>
         <p:nvSpPr>
           <p:cNvPr id="8" name="Footer Placeholder 3"/>
@@ -3720,39 +3744,6 @@
           </a:p>
         </p:txBody>
       </p:sp>
-      <p:pic>
-        <p:nvPicPr>
-          <p:cNvPr id="327688" name="Picture 8"/>
-          <p:cNvPicPr>
-            <a:picLocks noChangeAspect="1" noChangeArrowheads="1"/>
-          </p:cNvPicPr>
-          <p:nvPr/>
-        </p:nvPicPr>
-        <p:blipFill>
-          <a:blip r:embed="rId2"/>
-          <a:srcRect/>
-          <a:stretch>
-            <a:fillRect/>
-          </a:stretch>
-        </p:blipFill>
-        <p:spPr bwMode="auto">
-          <a:xfrm>
-            <a:off x="2438400" y="2438400"/>
-            <a:ext cx="3657600" cy="3641725"/>
-          </a:xfrm>
-          <a:prstGeom prst="rect">
-            <a:avLst/>
-          </a:prstGeom>
-          <a:noFill/>
-          <a:ln w="9525">
-            <a:noFill/>
-            <a:miter lim="800000"/>
-            <a:headEnd/>
-            <a:tailEnd/>
-          </a:ln>
-          <a:effectLst/>
-        </p:spPr>
-      </p:pic>
       <p:sp>
         <p:nvSpPr>
           <p:cNvPr id="327689" name="AutoShape 9"/>
@@ -3763,7 +3754,7 @@
         </p:nvSpPr>
         <p:spPr bwMode="auto">
           <a:xfrm>
-            <a:off x="6096000" y="4459287"/>
+            <a:off x="6811820" y="4599708"/>
             <a:ext cx="1600200" cy="609600"/>
           </a:xfrm>
           <a:prstGeom prst="borderCallout2">
@@ -3797,29 +3788,29 @@
           <a:p>
             <a:pPr algn="ctr"/>
             <a:r>
-              <a:rPr lang="en-US"/>
+              <a:rPr lang="en-US" dirty="0"/>
               <a:t>H</a:t>
             </a:r>
             <a:r>
-              <a:rPr lang="en-US" baseline="-25000"/>
+              <a:rPr lang="en-US" baseline="-25000" dirty="0"/>
               <a:t>0</a:t>
             </a:r>
             <a:r>
-              <a:rPr lang="en-US"/>
+              <a:rPr lang="en-US" dirty="0"/>
               <a:t>: </a:t>
             </a:r>
             <a:r>
-              <a:rPr lang="en-US">
+              <a:rPr lang="en-US" dirty="0">
                 <a:latin typeface="Symbol" pitchFamily="18" charset="2"/>
               </a:rPr>
               <a:t>b</a:t>
             </a:r>
             <a:r>
-              <a:rPr lang="en-US" baseline="-25000"/>
+              <a:rPr lang="en-US" baseline="-25000" dirty="0"/>
               <a:t>1</a:t>
             </a:r>
             <a:r>
-              <a:rPr lang="en-US"/>
+              <a:rPr lang="en-US" dirty="0"/>
               <a:t>=0</a:t>
             </a:r>
           </a:p>
@@ -3835,7 +3826,7 @@
         </p:nvSpPr>
         <p:spPr bwMode="auto">
           <a:xfrm>
-            <a:off x="6248400" y="3201987"/>
+            <a:off x="6811820" y="3380508"/>
             <a:ext cx="1600200" cy="609600"/>
           </a:xfrm>
           <a:prstGeom prst="borderCallout2">
@@ -3869,35 +3860,35 @@
           <a:p>
             <a:pPr algn="ctr"/>
             <a:r>
-              <a:rPr lang="en-US"/>
+              <a:rPr lang="en-US" dirty="0"/>
               <a:t>H</a:t>
             </a:r>
             <a:r>
-              <a:rPr lang="en-US" baseline="-25000"/>
+              <a:rPr lang="en-US" baseline="-25000" dirty="0"/>
               <a:t>A</a:t>
             </a:r>
             <a:r>
-              <a:rPr lang="en-US"/>
+              <a:rPr lang="en-US" dirty="0"/>
               <a:t>: </a:t>
             </a:r>
             <a:r>
-              <a:rPr lang="en-US">
+              <a:rPr lang="en-US" dirty="0">
                 <a:latin typeface="Symbol" pitchFamily="18" charset="2"/>
               </a:rPr>
               <a:t>b</a:t>
             </a:r>
             <a:r>
-              <a:rPr lang="en-US" baseline="-25000"/>
+              <a:rPr lang="en-US" baseline="-25000" dirty="0"/>
               <a:t>1</a:t>
             </a:r>
             <a:r>
-              <a:rPr lang="en-US">
+              <a:rPr lang="en-US" dirty="0">
                 <a:cs typeface="Arial" charset="0"/>
               </a:rPr>
               <a:t>≠</a:t>
             </a:r>
             <a:r>
-              <a:rPr lang="en-US"/>
+              <a:rPr lang="en-US" dirty="0"/>
               <a:t>0</a:t>
             </a:r>
           </a:p>
@@ -3920,6 +3911,9 @@
                     <p:cTn id="3" fill="hold">
                       <p:stCondLst>
                         <p:cond delay="indefinite"/>
+                        <p:cond evt="onBegin" delay="0">
+                          <p:tn val="2"/>
+                        </p:cond>
                       </p:stCondLst>
                       <p:childTnLst>
                         <p:par>
@@ -3929,7 +3923,7 @@
                             </p:stCondLst>
                             <p:childTnLst>
                               <p:par>
-                                <p:cTn id="5" presetID="9" presetClass="entr" presetSubtype="0" fill="hold" nodeType="clickEffect">
+                                <p:cTn id="5" presetID="9" presetClass="entr" presetSubtype="0" fill="hold" grpId="0" nodeType="afterEffect">
                                   <p:stCondLst>
                                     <p:cond delay="0"/>
                                   </p:stCondLst>
@@ -3942,7 +3936,7 @@
                                           </p:stCondLst>
                                         </p:cTn>
                                         <p:tgtEl>
-                                          <p:spTgt spid="327688"/>
+                                          <p:spTgt spid="327689"/>
                                         </p:tgtEl>
                                         <p:attrNameLst>
                                           <p:attrName>style.visibility</p:attrName>
@@ -3956,7 +3950,7 @@
                                       <p:cBhvr>
                                         <p:cTn id="7" dur="500"/>
                                         <p:tgtEl>
-                                          <p:spTgt spid="327688"/>
+                                          <p:spTgt spid="327689"/>
                                         </p:tgtEl>
                                       </p:cBhvr>
                                     </p:animEffect>
@@ -3986,7 +3980,7 @@
                                           </p:stCondLst>
                                         </p:cTn>
                                         <p:tgtEl>
-                                          <p:spTgt spid="327689"/>
+                                          <p:spTgt spid="327690"/>
                                         </p:tgtEl>
                                         <p:attrNameLst>
                                           <p:attrName>style.visibility</p:attrName>
@@ -3999,50 +3993,6 @@
                                     <p:animEffect transition="in" filter="dissolve">
                                       <p:cBhvr>
                                         <p:cTn id="11" dur="500"/>
-                                        <p:tgtEl>
-                                          <p:spTgt spid="327689"/>
-                                        </p:tgtEl>
-                                      </p:cBhvr>
-                                    </p:animEffect>
-                                  </p:childTnLst>
-                                </p:cTn>
-                              </p:par>
-                            </p:childTnLst>
-                          </p:cTn>
-                        </p:par>
-                        <p:par>
-                          <p:cTn id="12" fill="hold">
-                            <p:stCondLst>
-                              <p:cond delay="1000"/>
-                            </p:stCondLst>
-                            <p:childTnLst>
-                              <p:par>
-                                <p:cTn id="13" presetID="9" presetClass="entr" presetSubtype="0" fill="hold" grpId="0" nodeType="afterEffect">
-                                  <p:stCondLst>
-                                    <p:cond delay="0"/>
-                                  </p:stCondLst>
-                                  <p:childTnLst>
-                                    <p:set>
-                                      <p:cBhvr>
-                                        <p:cTn id="14" dur="1" fill="hold">
-                                          <p:stCondLst>
-                                            <p:cond delay="0"/>
-                                          </p:stCondLst>
-                                        </p:cTn>
-                                        <p:tgtEl>
-                                          <p:spTgt spid="327690"/>
-                                        </p:tgtEl>
-                                        <p:attrNameLst>
-                                          <p:attrName>style.visibility</p:attrName>
-                                        </p:attrNameLst>
-                                      </p:cBhvr>
-                                      <p:to>
-                                        <p:strVal val="visible"/>
-                                      </p:to>
-                                    </p:set>
-                                    <p:animEffect transition="in" filter="dissolve">
-                                      <p:cBhvr>
-                                        <p:cTn id="15" dur="500"/>
                                         <p:tgtEl>
                                           <p:spTgt spid="327690"/>
                                         </p:tgtEl>
@@ -4746,6 +4696,30 @@
           <a:chExt cx="0" cy="0"/>
         </a:xfrm>
       </p:grpSpPr>
+      <p:pic>
+        <p:nvPicPr>
+          <p:cNvPr id="3" name="Picture 2"/>
+          <p:cNvPicPr>
+            <a:picLocks noChangeAspect="1"/>
+          </p:cNvPicPr>
+          <p:nvPr/>
+        </p:nvPicPr>
+        <p:blipFill>
+          <a:blip r:embed="rId2"/>
+          <a:stretch>
+            <a:fillRect/>
+          </a:stretch>
+        </p:blipFill>
+        <p:spPr>
+          <a:xfrm>
+            <a:off x="1066800" y="1752600"/>
+            <a:ext cx="4114800" cy="4114800"/>
+          </a:xfrm>
+          <a:prstGeom prst="rect">
+            <a:avLst/>
+          </a:prstGeom>
+        </p:spPr>
+      </p:pic>
       <p:sp>
         <p:nvSpPr>
           <p:cNvPr id="10" name="Footer Placeholder 3"/>
@@ -4829,7 +4803,7 @@
         </p:nvSpPr>
         <p:spPr bwMode="auto">
           <a:xfrm>
-            <a:off x="6400800" y="2133600"/>
+            <a:off x="5943600" y="2057400"/>
             <a:ext cx="2362200" cy="495300"/>
           </a:xfrm>
           <a:prstGeom prst="borderCallout2">
@@ -4877,7 +4851,7 @@
         </p:nvSpPr>
         <p:spPr bwMode="auto">
           <a:xfrm>
-            <a:off x="6248400" y="2781300"/>
+            <a:off x="5791200" y="2705100"/>
             <a:ext cx="2819400" cy="495300"/>
           </a:xfrm>
           <a:prstGeom prst="borderCallout2">
@@ -4915,39 +4889,6 @@
           </a:p>
         </p:txBody>
       </p:sp>
-      <p:pic>
-        <p:nvPicPr>
-          <p:cNvPr id="333833" name="Picture 9"/>
-          <p:cNvPicPr>
-            <a:picLocks noChangeAspect="1" noChangeArrowheads="1"/>
-          </p:cNvPicPr>
-          <p:nvPr/>
-        </p:nvPicPr>
-        <p:blipFill>
-          <a:blip r:embed="rId2"/>
-          <a:srcRect/>
-          <a:stretch>
-            <a:fillRect/>
-          </a:stretch>
-        </p:blipFill>
-        <p:spPr bwMode="auto">
-          <a:xfrm>
-            <a:off x="838200" y="1544638"/>
-            <a:ext cx="4800600" cy="4779962"/>
-          </a:xfrm>
-          <a:prstGeom prst="rect">
-            <a:avLst/>
-          </a:prstGeom>
-          <a:noFill/>
-          <a:ln w="9525">
-            <a:noFill/>
-            <a:miter lim="800000"/>
-            <a:headEnd/>
-            <a:tailEnd/>
-          </a:ln>
-          <a:effectLst/>
-        </p:spPr>
-      </p:pic>
       <p:sp>
         <p:nvSpPr>
           <p:cNvPr id="333834" name="Line 10"/>
@@ -4958,8 +4899,8 @@
         </p:nvSpPr>
         <p:spPr bwMode="auto">
           <a:xfrm flipV="1">
-            <a:off x="3719513" y="3495675"/>
-            <a:ext cx="0" cy="1822450"/>
+            <a:off x="3719512" y="3562349"/>
+            <a:ext cx="14287" cy="1755775"/>
           </a:xfrm>
           <a:prstGeom prst="line">
             <a:avLst/>
@@ -4993,8 +4934,8 @@
         </p:nvSpPr>
         <p:spPr bwMode="auto">
           <a:xfrm flipH="1">
-            <a:off x="1828800" y="3500438"/>
-            <a:ext cx="1874838" cy="4762"/>
+            <a:off x="1600200" y="3557587"/>
+            <a:ext cx="2113450" cy="4762"/>
           </a:xfrm>
           <a:prstGeom prst="line">
             <a:avLst/>
@@ -5028,8 +4969,8 @@
         </p:nvSpPr>
         <p:spPr bwMode="auto">
           <a:xfrm>
-            <a:off x="3417888" y="5257800"/>
-            <a:ext cx="608012" cy="457200"/>
+            <a:off x="3458039" y="5257800"/>
+            <a:ext cx="527709" cy="461665"/>
           </a:xfrm>
           <a:prstGeom prst="rect">
             <a:avLst/>
@@ -5051,13 +4992,18 @@
           <a:p>
             <a:pPr algn="ctr"/>
             <a:r>
-              <a:rPr lang="en-US" sz="2400" b="1">
+              <a:rPr lang="en-US" sz="2400" b="1" dirty="0" smtClean="0">
                 <a:solidFill>
                   <a:schemeClr val="accent2"/>
                 </a:solidFill>
               </a:rPr>
-              <a:t>3.5</a:t>
-            </a:r>
+              <a:t>35</a:t>
+            </a:r>
+            <a:endParaRPr lang="en-US" sz="2400" b="1" dirty="0">
+              <a:solidFill>
+                <a:schemeClr val="accent2"/>
+              </a:solidFill>
+            </a:endParaRPr>
           </a:p>
         </p:txBody>
       </p:sp>
@@ -5071,8 +5017,8 @@
         </p:nvSpPr>
         <p:spPr bwMode="auto">
           <a:xfrm>
-            <a:off x="1752600" y="3105150"/>
-            <a:ext cx="947738" cy="457200"/>
+            <a:off x="1572481" y="3124200"/>
+            <a:ext cx="699230" cy="461665"/>
           </a:xfrm>
           <a:prstGeom prst="rect">
             <a:avLst/>
@@ -5094,13 +5040,26 @@
           <a:p>
             <a:pPr algn="ctr"/>
             <a:r>
-              <a:rPr lang="en-US" sz="2400" b="1">
+              <a:rPr lang="en-US" sz="2400" b="1" dirty="0">
                 <a:solidFill>
                   <a:schemeClr val="accent2"/>
                 </a:solidFill>
               </a:rPr>
-              <a:t>20.93</a:t>
-            </a:r>
+              <a:t>8</a:t>
+            </a:r>
+            <a:r>
+              <a:rPr lang="en-US" sz="2400" b="1" dirty="0" smtClean="0">
+                <a:solidFill>
+                  <a:schemeClr val="accent2"/>
+                </a:solidFill>
+              </a:rPr>
+              <a:t>93</a:t>
+            </a:r>
+            <a:endParaRPr lang="en-US" sz="2400" b="1" dirty="0">
+              <a:solidFill>
+                <a:schemeClr val="accent2"/>
+              </a:solidFill>
+            </a:endParaRPr>
           </a:p>
         </p:txBody>
       </p:sp>
@@ -5621,35 +5580,26 @@
       </p:pic>
       <p:pic>
         <p:nvPicPr>
-          <p:cNvPr id="316422" name="Picture 6"/>
+          <p:cNvPr id="3" name="Picture 2"/>
           <p:cNvPicPr>
-            <a:picLocks noChangeAspect="1" noChangeArrowheads="1"/>
+            <a:picLocks noChangeAspect="1"/>
           </p:cNvPicPr>
           <p:nvPr/>
         </p:nvPicPr>
         <p:blipFill>
           <a:blip r:embed="rId3"/>
-          <a:srcRect/>
           <a:stretch>
             <a:fillRect/>
           </a:stretch>
         </p:blipFill>
-        <p:spPr bwMode="auto">
+        <p:spPr>
           <a:xfrm>
-            <a:off x="4730750" y="2457450"/>
-            <a:ext cx="4108450" cy="4090988"/>
+            <a:off x="5303520" y="2740025"/>
+            <a:ext cx="3657600" cy="3657600"/>
           </a:xfrm>
           <a:prstGeom prst="rect">
             <a:avLst/>
           </a:prstGeom>
-          <a:noFill/>
-          <a:ln w="9525">
-            <a:noFill/>
-            <a:miter lim="800000"/>
-            <a:headEnd/>
-            <a:tailEnd/>
-          </a:ln>
-          <a:effectLst/>
         </p:spPr>
       </p:pic>
     </p:spTree>
@@ -5755,59 +5705,6 @@
                                         <p:cTn id="11" dur="500"/>
                                         <p:tgtEl>
                                           <p:spTgt spid="316420"/>
-                                        </p:tgtEl>
-                                      </p:cBhvr>
-                                    </p:animEffect>
-                                  </p:childTnLst>
-                                </p:cTn>
-                              </p:par>
-                            </p:childTnLst>
-                          </p:cTn>
-                        </p:par>
-                      </p:childTnLst>
-                    </p:cTn>
-                  </p:par>
-                  <p:par>
-                    <p:cTn id="12" fill="hold">
-                      <p:stCondLst>
-                        <p:cond delay="indefinite"/>
-                      </p:stCondLst>
-                      <p:childTnLst>
-                        <p:par>
-                          <p:cTn id="13" fill="hold">
-                            <p:stCondLst>
-                              <p:cond delay="0"/>
-                            </p:stCondLst>
-                            <p:childTnLst>
-                              <p:par>
-                                <p:cTn id="14" presetID="9" presetClass="entr" presetSubtype="0" fill="hold" nodeType="clickEffect">
-                                  <p:stCondLst>
-                                    <p:cond delay="0"/>
-                                  </p:stCondLst>
-                                  <p:childTnLst>
-                                    <p:set>
-                                      <p:cBhvr>
-                                        <p:cTn id="15" dur="1" fill="hold">
-                                          <p:stCondLst>
-                                            <p:cond delay="0"/>
-                                          </p:stCondLst>
-                                        </p:cTn>
-                                        <p:tgtEl>
-                                          <p:spTgt spid="316422"/>
-                                        </p:tgtEl>
-                                        <p:attrNameLst>
-                                          <p:attrName>style.visibility</p:attrName>
-                                        </p:attrNameLst>
-                                      </p:cBhvr>
-                                      <p:to>
-                                        <p:strVal val="visible"/>
-                                      </p:to>
-                                    </p:set>
-                                    <p:animEffect transition="in" filter="dissolve">
-                                      <p:cBhvr>
-                                        <p:cTn id="16" dur="500"/>
-                                        <p:tgtEl>
-                                          <p:spTgt spid="316422"/>
                                         </p:tgtEl>
                                       </p:cBhvr>
                                     </p:animEffect>
@@ -6300,35 +6197,26 @@
       </p:sp>
       <p:pic>
         <p:nvPicPr>
-          <p:cNvPr id="317456" name="Picture 16"/>
+          <p:cNvPr id="2" name="Picture 1"/>
           <p:cNvPicPr>
-            <a:picLocks noChangeAspect="1" noChangeArrowheads="1"/>
+            <a:picLocks noChangeAspect="1"/>
           </p:cNvPicPr>
           <p:nvPr/>
         </p:nvPicPr>
         <p:blipFill>
           <a:blip r:embed="rId3"/>
-          <a:srcRect/>
           <a:stretch>
             <a:fillRect/>
           </a:stretch>
         </p:blipFill>
-        <p:spPr bwMode="auto">
+        <p:spPr>
           <a:xfrm>
-            <a:off x="5035550" y="2690813"/>
-            <a:ext cx="3956050" cy="3938587"/>
+            <a:off x="5303520" y="2743200"/>
+            <a:ext cx="3657600" cy="3657600"/>
           </a:xfrm>
           <a:prstGeom prst="rect">
             <a:avLst/>
           </a:prstGeom>
-          <a:noFill/>
-          <a:ln w="9525">
-            <a:noFill/>
-            <a:miter lim="800000"/>
-            <a:headEnd/>
-            <a:tailEnd/>
-          </a:ln>
-          <a:effectLst/>
         </p:spPr>
       </p:pic>
     </p:spTree>
@@ -6622,59 +6510,6 @@
                       </p:childTnLst>
                     </p:cTn>
                   </p:par>
-                  <p:par>
-                    <p:cTn id="28" fill="hold">
-                      <p:stCondLst>
-                        <p:cond delay="indefinite"/>
-                      </p:stCondLst>
-                      <p:childTnLst>
-                        <p:par>
-                          <p:cTn id="29" fill="hold">
-                            <p:stCondLst>
-                              <p:cond delay="0"/>
-                            </p:stCondLst>
-                            <p:childTnLst>
-                              <p:par>
-                                <p:cTn id="30" presetID="9" presetClass="entr" presetSubtype="0" fill="hold" nodeType="clickEffect">
-                                  <p:stCondLst>
-                                    <p:cond delay="0"/>
-                                  </p:stCondLst>
-                                  <p:childTnLst>
-                                    <p:set>
-                                      <p:cBhvr>
-                                        <p:cTn id="31" dur="1" fill="hold">
-                                          <p:stCondLst>
-                                            <p:cond delay="0"/>
-                                          </p:stCondLst>
-                                        </p:cTn>
-                                        <p:tgtEl>
-                                          <p:spTgt spid="317456"/>
-                                        </p:tgtEl>
-                                        <p:attrNameLst>
-                                          <p:attrName>style.visibility</p:attrName>
-                                        </p:attrNameLst>
-                                      </p:cBhvr>
-                                      <p:to>
-                                        <p:strVal val="visible"/>
-                                      </p:to>
-                                    </p:set>
-                                    <p:animEffect transition="in" filter="dissolve">
-                                      <p:cBhvr>
-                                        <p:cTn id="32" dur="500"/>
-                                        <p:tgtEl>
-                                          <p:spTgt spid="317456"/>
-                                        </p:tgtEl>
-                                      </p:cBhvr>
-                                    </p:animEffect>
-                                  </p:childTnLst>
-                                </p:cTn>
-                              </p:par>
-                            </p:childTnLst>
-                          </p:cTn>
-                        </p:par>
-                      </p:childTnLst>
-                    </p:cTn>
-                  </p:par>
                 </p:childTnLst>
               </p:cTn>
               <p:prevCondLst>
@@ -6722,6 +6557,30 @@
           <a:chExt cx="0" cy="0"/>
         </a:xfrm>
       </p:grpSpPr>
+      <p:pic>
+        <p:nvPicPr>
+          <p:cNvPr id="14" name="Picture 13"/>
+          <p:cNvPicPr>
+            <a:picLocks noChangeAspect="1"/>
+          </p:cNvPicPr>
+          <p:nvPr/>
+        </p:nvPicPr>
+        <p:blipFill>
+          <a:blip r:embed="rId2"/>
+          <a:stretch>
+            <a:fillRect/>
+          </a:stretch>
+        </p:blipFill>
+        <p:spPr>
+          <a:xfrm>
+            <a:off x="5303520" y="2743200"/>
+            <a:ext cx="3657600" cy="3657600"/>
+          </a:xfrm>
+          <a:prstGeom prst="rect">
+            <a:avLst/>
+          </a:prstGeom>
+        </p:spPr>
+      </p:pic>
       <p:sp>
         <p:nvSpPr>
           <p:cNvPr id="12" name="Footer Placeholder 3"/>
@@ -6768,39 +6627,6 @@
           </a:p>
         </p:txBody>
       </p:sp>
-      <p:pic>
-        <p:nvPicPr>
-          <p:cNvPr id="318476" name="Picture 12"/>
-          <p:cNvPicPr>
-            <a:picLocks noChangeAspect="1" noChangeArrowheads="1"/>
-          </p:cNvPicPr>
-          <p:nvPr/>
-        </p:nvPicPr>
-        <p:blipFill>
-          <a:blip r:embed="rId2"/>
-          <a:srcRect/>
-          <a:stretch>
-            <a:fillRect/>
-          </a:stretch>
-        </p:blipFill>
-        <p:spPr bwMode="auto">
-          <a:xfrm>
-            <a:off x="5035550" y="2690813"/>
-            <a:ext cx="3956050" cy="3938587"/>
-          </a:xfrm>
-          <a:prstGeom prst="rect">
-            <a:avLst/>
-          </a:prstGeom>
-          <a:noFill/>
-          <a:ln w="9525">
-            <a:noFill/>
-            <a:miter lim="800000"/>
-            <a:headEnd/>
-            <a:tailEnd/>
-          </a:ln>
-          <a:effectLst/>
-        </p:spPr>
-      </p:pic>
       <p:sp>
         <p:nvSpPr>
           <p:cNvPr id="318467" name="Rectangle 3"/>
@@ -6841,7 +6667,7 @@
         <p:spPr>
           <a:xfrm>
             <a:off x="152400" y="990600"/>
-            <a:ext cx="8839200" cy="1905000"/>
+            <a:ext cx="7848600" cy="1905000"/>
           </a:xfrm>
         </p:spPr>
         <p:txBody>
@@ -6861,29 +6687,30 @@
               <a:t> </a:t>
             </a:r>
             <a:r>
-              <a:rPr lang="en-US" sz="2800" dirty="0" err="1"/>
-              <a:t>fert.succ</a:t>
+              <a:rPr lang="en-US" sz="2800" dirty="0" smtClean="0"/>
+              <a:t>density </a:t>
             </a:r>
             <a:r>
               <a:rPr lang="en-US" sz="2800" dirty="0"/>
-              <a:t> for </a:t>
+              <a:t>for </a:t>
             </a:r>
             <a:r>
               <a:rPr lang="en-US" sz="2800" dirty="0" smtClean="0"/>
-              <a:t>all individuals </a:t>
+              <a:t>all </a:t>
+            </a:r>
+            <a:r>
+              <a:rPr lang="en-US" sz="2800" dirty="0" smtClean="0"/>
+              <a:t>trees </a:t>
             </a:r>
             <a:r>
               <a:rPr lang="en-US" sz="2800" dirty="0"/>
-              <a:t>with a </a:t>
-            </a:r>
-            <a:r>
-              <a:rPr lang="en-US" sz="2800" dirty="0" err="1"/>
-              <a:t>step.len</a:t>
-            </a:r>
-            <a:r>
-              <a:rPr lang="en-US" sz="2800" dirty="0"/>
-              <a:t> of 3.5</a:t>
-            </a:r>
+              <a:t>with </a:t>
+            </a:r>
+            <a:r>
+              <a:rPr lang="en-US" sz="2800" dirty="0" smtClean="0"/>
+              <a:t>damage of  3.5%</a:t>
+            </a:r>
+            <a:endParaRPr lang="en-US" sz="2800" dirty="0"/>
           </a:p>
           <a:p>
             <a:pPr marL="457200" lvl="1" indent="0">
@@ -6897,7 +6724,16 @@
                 </a:solidFill>
                 <a:latin typeface="Courier New" pitchFamily="49" charset="0"/>
               </a:rPr>
-              <a:t>  fit   </a:t>
+              <a:t>  </a:t>
+            </a:r>
+            <a:r>
+              <a:rPr lang="en-US" sz="2400" b="1" dirty="0" smtClean="0">
+                <a:solidFill>
+                  <a:schemeClr val="accent2"/>
+                </a:solidFill>
+                <a:latin typeface="Courier New" pitchFamily="49" charset="0"/>
+              </a:rPr>
+              <a:t> fit    </a:t>
             </a:r>
             <a:r>
               <a:rPr lang="en-US" sz="2400" b="1" dirty="0" err="1">
@@ -6915,10 +6751,19 @@
                 </a:solidFill>
                 <a:latin typeface="Courier New" pitchFamily="49" charset="0"/>
               </a:rPr>
-              <a:t>   </a:t>
-            </a:r>
-            <a:r>
-              <a:rPr lang="en-US" sz="2400" b="1" dirty="0" err="1">
+              <a:t> </a:t>
+            </a:r>
+            <a:r>
+              <a:rPr lang="en-US" sz="2400" b="1" dirty="0" smtClean="0">
+                <a:solidFill>
+                  <a:schemeClr val="accent2"/>
+                </a:solidFill>
+                <a:latin typeface="Courier New" pitchFamily="49" charset="0"/>
+              </a:rPr>
+              <a:t>    </a:t>
+            </a:r>
+            <a:r>
+              <a:rPr lang="en-US" sz="2400" b="1" dirty="0" err="1" smtClean="0">
                 <a:solidFill>
                   <a:schemeClr val="accent2"/>
                 </a:solidFill>
@@ -6939,14 +6784,29 @@
               <a:buNone/>
             </a:pPr>
             <a:r>
-              <a:rPr lang="en-US" sz="2400" b="1" dirty="0">
+              <a:rPr lang="en-US" sz="2400" b="1" dirty="0" smtClean="0">
                 <a:solidFill>
                   <a:schemeClr val="accent2"/>
                 </a:solidFill>
                 <a:latin typeface="Courier New" pitchFamily="49" charset="0"/>
               </a:rPr>
-              <a:t>20.93 17.60 24.26</a:t>
-            </a:r>
+              <a:t>8</a:t>
+            </a:r>
+            <a:r>
+              <a:rPr lang="en-US" sz="2400" b="1" dirty="0" smtClean="0">
+                <a:solidFill>
+                  <a:schemeClr val="accent2"/>
+                </a:solidFill>
+                <a:latin typeface="Courier New" pitchFamily="49" charset="0"/>
+              </a:rPr>
+              <a:t>93.05 631.60 1154.50</a:t>
+            </a:r>
+            <a:endParaRPr lang="en-US" sz="2400" b="1" dirty="0">
+              <a:solidFill>
+                <a:schemeClr val="accent2"/>
+              </a:solidFill>
+              <a:latin typeface="Courier New" pitchFamily="49" charset="0"/>
+            </a:endParaRPr>
           </a:p>
         </p:txBody>
       </p:sp>
@@ -6960,8 +6820,8 @@
         </p:nvSpPr>
         <p:spPr bwMode="auto">
           <a:xfrm>
-            <a:off x="152400" y="3124200"/>
-            <a:ext cx="4419600" cy="2286000"/>
+            <a:off x="152399" y="3124200"/>
+            <a:ext cx="5181600" cy="2286000"/>
           </a:xfrm>
           <a:prstGeom prst="rect">
             <a:avLst/>
@@ -6994,39 +6854,37 @@
               <a:t>Predict </a:t>
             </a:r>
             <a:r>
-              <a:rPr lang="en-US" dirty="0" err="1"/>
-              <a:t>fert.succ</a:t>
+              <a:rPr lang="en-US" dirty="0" smtClean="0"/>
+              <a:t>density </a:t>
             </a:r>
             <a:r>
               <a:rPr lang="en-US" dirty="0"/>
-              <a:t> for an </a:t>
-            </a:r>
-            <a:r>
-              <a:rPr lang="en-US" b="1" i="1" dirty="0"/>
-              <a:t>individual</a:t>
+              <a:t>for </a:t>
+            </a:r>
+            <a:r>
+              <a:rPr lang="en-US" dirty="0" smtClean="0"/>
+              <a:t>a </a:t>
+            </a:r>
+            <a:r>
+              <a:rPr lang="en-US" b="1" i="1" dirty="0" smtClean="0"/>
+              <a:t>tree</a:t>
+            </a:r>
+            <a:r>
+              <a:rPr lang="en-US" dirty="0" smtClean="0"/>
+              <a:t> </a:t>
             </a:r>
             <a:r>
               <a:rPr lang="en-US" dirty="0"/>
-              <a:t> with a </a:t>
-            </a:r>
-            <a:r>
-              <a:rPr lang="en-US" dirty="0" err="1"/>
-              <a:t>step.len</a:t>
-            </a:r>
-            <a:r>
-              <a:rPr lang="en-US" dirty="0"/>
-              <a:t> of 3.5</a:t>
-            </a:r>
-          </a:p>
-          <a:p>
-            <a:pPr lvl="1">
-              <a:lnSpc>
-                <a:spcPct val="80000"/>
-              </a:lnSpc>
-              <a:spcBef>
-                <a:spcPct val="20000"/>
-              </a:spcBef>
-            </a:pPr>
+              <a:t>with a </a:t>
+            </a:r>
+            <a:r>
+              <a:rPr lang="en-US" dirty="0" smtClean="0"/>
+              <a:t>damage of 3.5%</a:t>
+            </a:r>
+            <a:endParaRPr lang="en-US" dirty="0"/>
+          </a:p>
+          <a:p>
+            <a:pPr lvl="1"/>
             <a:r>
               <a:rPr lang="en-US" sz="2400" b="1" dirty="0">
                 <a:solidFill>
@@ -7034,7 +6892,16 @@
                 </a:solidFill>
                 <a:latin typeface="Courier New" pitchFamily="49" charset="0"/>
               </a:rPr>
-              <a:t>  fit   </a:t>
+              <a:t> </a:t>
+            </a:r>
+            <a:r>
+              <a:rPr lang="en-US" sz="2400" b="1" dirty="0" smtClean="0">
+                <a:solidFill>
+                  <a:schemeClr val="accent2"/>
+                </a:solidFill>
+                <a:latin typeface="Courier New" pitchFamily="49" charset="0"/>
+              </a:rPr>
+              <a:t>  fit    </a:t>
             </a:r>
             <a:r>
               <a:rPr lang="en-US" sz="2400" b="1" dirty="0" err="1">
@@ -7052,7 +6919,16 @@
                 </a:solidFill>
                 <a:latin typeface="Courier New" pitchFamily="49" charset="0"/>
               </a:rPr>
-              <a:t>   </a:t>
+              <a:t> </a:t>
+            </a:r>
+            <a:r>
+              <a:rPr lang="en-US" sz="2400" b="1" dirty="0" smtClean="0">
+                <a:solidFill>
+                  <a:schemeClr val="accent2"/>
+                </a:solidFill>
+                <a:latin typeface="Courier New" pitchFamily="49" charset="0"/>
+              </a:rPr>
+              <a:t>    </a:t>
             </a:r>
             <a:r>
               <a:rPr lang="en-US" sz="2400" b="1" dirty="0" err="1">
@@ -7071,23 +6947,22 @@
             </a:endParaRPr>
           </a:p>
           <a:p>
-            <a:pPr lvl="1">
-              <a:lnSpc>
-                <a:spcPct val="80000"/>
-              </a:lnSpc>
-              <a:spcBef>
-                <a:spcPct val="20000"/>
-              </a:spcBef>
-            </a:pPr>
-            <a:r>
-              <a:rPr lang="en-US" sz="2400" b="1" dirty="0">
+            <a:pPr lvl="1"/>
+            <a:r>
+              <a:rPr lang="en-US" sz="2400" b="1" dirty="0" smtClean="0">
                 <a:solidFill>
                   <a:schemeClr val="accent2"/>
                 </a:solidFill>
                 <a:latin typeface="Courier New" pitchFamily="49" charset="0"/>
               </a:rPr>
-              <a:t>20.93 10.51 31.353</a:t>
-            </a:r>
+              <a:t>893.05 102.42 1683.69</a:t>
+            </a:r>
+            <a:endParaRPr lang="en-US" sz="2400" b="1" dirty="0">
+              <a:solidFill>
+                <a:schemeClr val="accent2"/>
+              </a:solidFill>
+              <a:latin typeface="Courier New" pitchFamily="49" charset="0"/>
+            </a:endParaRPr>
           </a:p>
         </p:txBody>
       </p:sp>
@@ -7101,8 +6976,8 @@
         </p:nvSpPr>
         <p:spPr bwMode="auto">
           <a:xfrm flipV="1">
-            <a:off x="7415213" y="4330700"/>
-            <a:ext cx="0" cy="1479550"/>
+            <a:off x="7772400" y="4478214"/>
+            <a:ext cx="0" cy="1389186"/>
           </a:xfrm>
           <a:prstGeom prst="line">
             <a:avLst/>
@@ -7136,8 +7011,8 @@
         </p:nvSpPr>
         <p:spPr bwMode="auto">
           <a:xfrm>
-            <a:off x="7148513" y="5775325"/>
-            <a:ext cx="536575" cy="396875"/>
+            <a:off x="7531000" y="5848290"/>
+            <a:ext cx="470000" cy="400110"/>
           </a:xfrm>
           <a:prstGeom prst="rect">
             <a:avLst/>
@@ -7159,13 +7034,53 @@
           <a:p>
             <a:pPr algn="ctr"/>
             <a:r>
-              <a:rPr lang="en-US" sz="2000" b="1">
+              <a:rPr lang="en-US" sz="2000" b="1" dirty="0" smtClean="0">
                 <a:solidFill>
                   <a:schemeClr val="accent2"/>
                 </a:solidFill>
               </a:rPr>
-              <a:t>3.5</a:t>
-            </a:r>
+              <a:t>35</a:t>
+            </a:r>
+            <a:endParaRPr lang="en-US" sz="2000" b="1" dirty="0">
+              <a:solidFill>
+                <a:schemeClr val="accent2"/>
+              </a:solidFill>
+            </a:endParaRPr>
+          </a:p>
+        </p:txBody>
+      </p:sp>
+      <p:sp>
+        <p:nvSpPr>
+          <p:cNvPr id="318473" name="Line 9"/>
+          <p:cNvSpPr>
+            <a:spLocks noChangeShapeType="1"/>
+          </p:cNvSpPr>
+          <p:nvPr/>
+        </p:nvSpPr>
+        <p:spPr bwMode="auto">
+          <a:xfrm>
+            <a:off x="7772400" y="3352800"/>
+            <a:ext cx="0" cy="2209800"/>
+          </a:xfrm>
+          <a:prstGeom prst="line">
+            <a:avLst/>
+          </a:prstGeom>
+          <a:noFill/>
+          <a:ln w="38100">
+            <a:solidFill>
+              <a:srgbClr val="FF0000"/>
+            </a:solidFill>
+            <a:round/>
+            <a:headEnd/>
+            <a:tailEnd/>
+          </a:ln>
+          <a:effectLst/>
+        </p:spPr>
+        <p:txBody>
+          <a:bodyPr/>
+          <a:lstStyle/>
+          <a:p>
+            <a:endParaRPr lang="en-US"/>
           </a:p>
         </p:txBody>
       </p:sp>
@@ -7179,8 +7094,8 @@
         </p:nvSpPr>
         <p:spPr bwMode="auto">
           <a:xfrm>
-            <a:off x="7410450" y="4146550"/>
-            <a:ext cx="0" cy="349250"/>
+            <a:off x="7772400" y="4047564"/>
+            <a:ext cx="1" cy="779586"/>
           </a:xfrm>
           <a:prstGeom prst="line">
             <a:avLst/>
@@ -7206,41 +7121,6 @@
       </p:sp>
       <p:sp>
         <p:nvSpPr>
-          <p:cNvPr id="318473" name="Line 9"/>
-          <p:cNvSpPr>
-            <a:spLocks noChangeShapeType="1"/>
-          </p:cNvSpPr>
-          <p:nvPr/>
-        </p:nvSpPr>
-        <p:spPr bwMode="auto">
-          <a:xfrm>
-            <a:off x="7410450" y="3851275"/>
-            <a:ext cx="0" cy="952500"/>
-          </a:xfrm>
-          <a:prstGeom prst="line">
-            <a:avLst/>
-          </a:prstGeom>
-          <a:noFill/>
-          <a:ln w="38100">
-            <a:solidFill>
-              <a:srgbClr val="FF0000"/>
-            </a:solidFill>
-            <a:round/>
-            <a:headEnd/>
-            <a:tailEnd/>
-          </a:ln>
-          <a:effectLst/>
-        </p:spPr>
-        <p:txBody>
-          <a:bodyPr/>
-          <a:lstStyle/>
-          <a:p>
-            <a:endParaRPr lang="en-US"/>
-          </a:p>
-        </p:txBody>
-      </p:sp>
-      <p:sp>
-        <p:nvSpPr>
           <p:cNvPr id="318474" name="Line 10"/>
           <p:cNvSpPr>
             <a:spLocks noChangeShapeType="1"/>
@@ -7248,9 +7128,9 @@
           <p:nvPr/>
         </p:nvSpPr>
         <p:spPr bwMode="auto">
-          <a:xfrm flipH="1" flipV="1">
-            <a:off x="5848350" y="4330700"/>
-            <a:ext cx="1543050" cy="6350"/>
+          <a:xfrm flipH="1">
+            <a:off x="5858930" y="4478214"/>
+            <a:ext cx="1913470" cy="30834"/>
           </a:xfrm>
           <a:prstGeom prst="line">
             <a:avLst/>
@@ -7284,8 +7164,8 @@
         </p:nvSpPr>
         <p:spPr bwMode="auto">
           <a:xfrm>
-            <a:off x="5765800" y="4013200"/>
-            <a:ext cx="755650" cy="366713"/>
+            <a:off x="5838826" y="4114800"/>
+            <a:ext cx="569388" cy="369332"/>
           </a:xfrm>
           <a:prstGeom prst="rect">
             <a:avLst/>
@@ -7307,13 +7187,26 @@
           <a:p>
             <a:pPr algn="ctr"/>
             <a:r>
-              <a:rPr lang="en-US" sz="1800" b="1">
+              <a:rPr lang="en-US" sz="1800" b="1" dirty="0">
                 <a:solidFill>
                   <a:schemeClr val="accent2"/>
                 </a:solidFill>
               </a:rPr>
-              <a:t>20.93</a:t>
-            </a:r>
+              <a:t>8</a:t>
+            </a:r>
+            <a:r>
+              <a:rPr lang="en-US" sz="1800" b="1" dirty="0" smtClean="0">
+                <a:solidFill>
+                  <a:schemeClr val="accent2"/>
+                </a:solidFill>
+              </a:rPr>
+              <a:t>93</a:t>
+            </a:r>
+            <a:endParaRPr lang="en-US" sz="1800" b="1" dirty="0">
+              <a:solidFill>
+                <a:schemeClr val="accent2"/>
+              </a:solidFill>
+            </a:endParaRPr>
           </a:p>
         </p:txBody>
       </p:sp>
@@ -7795,39 +7688,26 @@
                                   </p:childTnLst>
                                 </p:cTn>
                               </p:par>
+                            </p:childTnLst>
+                          </p:cTn>
+                        </p:par>
+                      </p:childTnLst>
+                    </p:cTn>
+                  </p:par>
+                  <p:par>
+                    <p:cTn id="45" fill="hold">
+                      <p:stCondLst>
+                        <p:cond delay="indefinite"/>
+                      </p:stCondLst>
+                      <p:childTnLst>
+                        <p:par>
+                          <p:cTn id="46" fill="hold">
+                            <p:stCondLst>
+                              <p:cond delay="0"/>
+                            </p:stCondLst>
+                            <p:childTnLst>
                               <p:par>
-                                <p:cTn id="45" presetID="1" presetClass="entr" presetSubtype="0" fill="hold" grpId="0" nodeType="withEffect">
-                                  <p:stCondLst>
-                                    <p:cond delay="0"/>
-                                  </p:stCondLst>
-                                  <p:childTnLst>
-                                    <p:set>
-                                      <p:cBhvr>
-                                        <p:cTn id="46" dur="1" fill="hold">
-                                          <p:stCondLst>
-                                            <p:cond delay="0"/>
-                                          </p:stCondLst>
-                                        </p:cTn>
-                                        <p:tgtEl>
-                                          <p:spTgt spid="318469">
-                                            <p:txEl>
-                                              <p:pRg st="1" end="1"/>
-                                            </p:txEl>
-                                          </p:spTgt>
-                                        </p:tgtEl>
-                                        <p:attrNameLst>
-                                          <p:attrName>style.visibility</p:attrName>
-                                        </p:attrNameLst>
-                                      </p:cBhvr>
-                                      <p:to>
-                                        <p:strVal val="visible"/>
-                                      </p:to>
-                                    </p:set>
-                                  </p:childTnLst>
-                                </p:cTn>
-                              </p:par>
-                              <p:par>
-                                <p:cTn id="47" presetID="1" presetClass="entr" presetSubtype="0" fill="hold" grpId="0" nodeType="withEffect">
+                                <p:cTn id="47" presetID="22" presetClass="entr" presetSubtype="4" fill="hold" grpId="1" nodeType="clickEffect">
                                   <p:stCondLst>
                                     <p:cond delay="0"/>
                                   </p:stCondLst>
@@ -7835,55 +7715,6 @@
                                     <p:set>
                                       <p:cBhvr>
                                         <p:cTn id="48" dur="1" fill="hold">
-                                          <p:stCondLst>
-                                            <p:cond delay="0"/>
-                                          </p:stCondLst>
-                                        </p:cTn>
-                                        <p:tgtEl>
-                                          <p:spTgt spid="318469">
-                                            <p:txEl>
-                                              <p:pRg st="2" end="2"/>
-                                            </p:txEl>
-                                          </p:spTgt>
-                                        </p:tgtEl>
-                                        <p:attrNameLst>
-                                          <p:attrName>style.visibility</p:attrName>
-                                        </p:attrNameLst>
-                                      </p:cBhvr>
-                                      <p:to>
-                                        <p:strVal val="visible"/>
-                                      </p:to>
-                                    </p:set>
-                                  </p:childTnLst>
-                                </p:cTn>
-                              </p:par>
-                            </p:childTnLst>
-                          </p:cTn>
-                        </p:par>
-                      </p:childTnLst>
-                    </p:cTn>
-                  </p:par>
-                  <p:par>
-                    <p:cTn id="49" fill="hold">
-                      <p:stCondLst>
-                        <p:cond delay="indefinite"/>
-                      </p:stCondLst>
-                      <p:childTnLst>
-                        <p:par>
-                          <p:cTn id="50" fill="hold">
-                            <p:stCondLst>
-                              <p:cond delay="0"/>
-                            </p:stCondLst>
-                            <p:childTnLst>
-                              <p:par>
-                                <p:cTn id="51" presetID="22" presetClass="entr" presetSubtype="4" fill="hold" grpId="1" nodeType="clickEffect">
-                                  <p:stCondLst>
-                                    <p:cond delay="0"/>
-                                  </p:stCondLst>
-                                  <p:childTnLst>
-                                    <p:set>
-                                      <p:cBhvr>
-                                        <p:cTn id="52" dur="1" fill="hold">
                                           <p:stCondLst>
                                             <p:cond delay="0"/>
                                           </p:stCondLst>
@@ -7901,7 +7732,7 @@
                                     </p:set>
                                     <p:animEffect transition="in" filter="wipe(down)">
                                       <p:cBhvr>
-                                        <p:cTn id="53" dur="500"/>
+                                        <p:cTn id="49" dur="500"/>
                                         <p:tgtEl>
                                           <p:spTgt spid="318471"/>
                                         </p:tgtEl>
@@ -7914,20 +7745,20 @@
                           </p:cTn>
                         </p:par>
                         <p:par>
-                          <p:cTn id="54" fill="hold">
+                          <p:cTn id="50" fill="hold">
                             <p:stCondLst>
                               <p:cond delay="500"/>
                             </p:stCondLst>
                             <p:childTnLst>
                               <p:par>
-                                <p:cTn id="55" presetID="22" presetClass="entr" presetSubtype="4" fill="hold" grpId="2" nodeType="afterEffect">
+                                <p:cTn id="51" presetID="22" presetClass="entr" presetSubtype="4" fill="hold" grpId="2" nodeType="afterEffect">
                                   <p:stCondLst>
                                     <p:cond delay="0"/>
                                   </p:stCondLst>
                                   <p:childTnLst>
                                     <p:set>
                                       <p:cBhvr>
-                                        <p:cTn id="56" dur="1" fill="hold">
+                                        <p:cTn id="52" dur="1" fill="hold">
                                           <p:stCondLst>
                                             <p:cond delay="0"/>
                                           </p:stCondLst>
@@ -7945,7 +7776,7 @@
                                     </p:set>
                                     <p:animEffect transition="in" filter="wipe(down)">
                                       <p:cBhvr>
-                                        <p:cTn id="57" dur="500"/>
+                                        <p:cTn id="53" dur="500"/>
                                         <p:tgtEl>
                                           <p:spTgt spid="318470"/>
                                         </p:tgtEl>
@@ -7958,20 +7789,20 @@
                           </p:cTn>
                         </p:par>
                         <p:par>
-                          <p:cTn id="58" fill="hold">
+                          <p:cTn id="54" fill="hold">
                             <p:stCondLst>
                               <p:cond delay="1000"/>
                             </p:stCondLst>
                             <p:childTnLst>
                               <p:par>
-                                <p:cTn id="59" presetID="22" presetClass="entr" presetSubtype="2" fill="hold" grpId="2" nodeType="afterEffect">
+                                <p:cTn id="55" presetID="22" presetClass="entr" presetSubtype="2" fill="hold" grpId="2" nodeType="afterEffect">
                                   <p:stCondLst>
                                     <p:cond delay="0"/>
                                   </p:stCondLst>
                                   <p:childTnLst>
                                     <p:set>
                                       <p:cBhvr>
-                                        <p:cTn id="60" dur="1" fill="hold">
+                                        <p:cTn id="56" dur="1" fill="hold">
                                           <p:stCondLst>
                                             <p:cond delay="0"/>
                                           </p:stCondLst>
@@ -7989,7 +7820,7 @@
                                     </p:set>
                                     <p:animEffect transition="in" filter="wipe(right)">
                                       <p:cBhvr>
-                                        <p:cTn id="61" dur="500"/>
+                                        <p:cTn id="57" dur="500"/>
                                         <p:tgtEl>
                                           <p:spTgt spid="318474"/>
                                         </p:tgtEl>
@@ -8002,20 +7833,20 @@
                           </p:cTn>
                         </p:par>
                         <p:par>
-                          <p:cTn id="62" fill="hold">
+                          <p:cTn id="58" fill="hold">
                             <p:stCondLst>
                               <p:cond delay="1500"/>
                             </p:stCondLst>
                             <p:childTnLst>
                               <p:par>
-                                <p:cTn id="63" presetID="22" presetClass="entr" presetSubtype="4" fill="hold" grpId="1" nodeType="afterEffect">
+                                <p:cTn id="59" presetID="22" presetClass="entr" presetSubtype="4" fill="hold" grpId="1" nodeType="afterEffect">
                                   <p:stCondLst>
                                     <p:cond delay="0"/>
                                   </p:stCondLst>
                                   <p:childTnLst>
                                     <p:set>
                                       <p:cBhvr>
-                                        <p:cTn id="64" dur="1" fill="hold">
+                                        <p:cTn id="60" dur="1" fill="hold">
                                           <p:stCondLst>
                                             <p:cond delay="0"/>
                                           </p:stCondLst>
@@ -8033,7 +7864,7 @@
                                     </p:set>
                                     <p:animEffect transition="in" filter="wipe(down)">
                                       <p:cBhvr>
-                                        <p:cTn id="65" dur="500"/>
+                                        <p:cTn id="61" dur="500"/>
                                         <p:tgtEl>
                                           <p:spTgt spid="318475"/>
                                         </p:tgtEl>
@@ -8049,26 +7880,26 @@
                     </p:cTn>
                   </p:par>
                   <p:par>
-                    <p:cTn id="66" fill="hold">
+                    <p:cTn id="62" fill="hold">
                       <p:stCondLst>
                         <p:cond delay="indefinite"/>
                       </p:stCondLst>
                       <p:childTnLst>
                         <p:par>
-                          <p:cTn id="67" fill="hold">
+                          <p:cTn id="63" fill="hold">
                             <p:stCondLst>
                               <p:cond delay="0"/>
                             </p:stCondLst>
                             <p:childTnLst>
                               <p:par>
-                                <p:cTn id="68" presetID="16" presetClass="entr" presetSubtype="42" fill="hold" grpId="0" nodeType="clickEffect">
+                                <p:cTn id="64" presetID="16" presetClass="entr" presetSubtype="42" fill="hold" grpId="0" nodeType="clickEffect">
                                   <p:stCondLst>
                                     <p:cond delay="0"/>
                                   </p:stCondLst>
                                   <p:childTnLst>
                                     <p:set>
                                       <p:cBhvr>
-                                        <p:cTn id="69" dur="1" fill="hold">
+                                        <p:cTn id="65" dur="1" fill="hold">
                                           <p:stCondLst>
                                             <p:cond delay="0"/>
                                           </p:stCondLst>
@@ -8086,7 +7917,7 @@
                                     </p:set>
                                     <p:animEffect transition="in" filter="barn(outHorizontal)">
                                       <p:cBhvr>
-                                        <p:cTn id="70" dur="500"/>
+                                        <p:cTn id="66" dur="500"/>
                                         <p:tgtEl>
                                           <p:spTgt spid="318473"/>
                                         </p:tgtEl>
@@ -8130,9 +7961,9 @@
       <p:bldP spid="318471" grpId="0"/>
       <p:bldP spid="318471" grpId="1"/>
       <p:bldP spid="318471" grpId="2"/>
+      <p:bldP spid="318473" grpId="0" animBg="1"/>
       <p:bldP spid="318472" grpId="0" animBg="1"/>
       <p:bldP spid="318472" grpId="1" animBg="1"/>
-      <p:bldP spid="318473" grpId="0" animBg="1"/>
       <p:bldP spid="318474" grpId="0" animBg="1"/>
       <p:bldP spid="318474" grpId="1" animBg="1"/>
       <p:bldP spid="318474" grpId="2" animBg="1"/>
@@ -8962,6 +8793,30 @@
           <a:chExt cx="0" cy="0"/>
         </a:xfrm>
       </p:grpSpPr>
+      <p:pic>
+        <p:nvPicPr>
+          <p:cNvPr id="13" name="Picture 12"/>
+          <p:cNvPicPr>
+            <a:picLocks noChangeAspect="1"/>
+          </p:cNvPicPr>
+          <p:nvPr/>
+        </p:nvPicPr>
+        <p:blipFill>
+          <a:blip r:embed="rId2"/>
+          <a:stretch>
+            <a:fillRect/>
+          </a:stretch>
+        </p:blipFill>
+        <p:spPr>
+          <a:xfrm>
+            <a:off x="2514600" y="2667000"/>
+            <a:ext cx="4114800" cy="4114800"/>
+          </a:xfrm>
+          <a:prstGeom prst="rect">
+            <a:avLst/>
+          </a:prstGeom>
+        </p:spPr>
+      </p:pic>
       <p:sp>
         <p:nvSpPr>
           <p:cNvPr id="11" name="Footer Placeholder 3"/>
@@ -9158,7 +9013,7 @@
         </p:nvSpPr>
         <p:spPr bwMode="auto">
           <a:xfrm>
-            <a:off x="7010400" y="4836225"/>
+            <a:off x="7010400" y="4986868"/>
             <a:ext cx="1600200" cy="609600"/>
           </a:xfrm>
           <a:prstGeom prst="borderCallout2">
@@ -9192,29 +9047,29 @@
           <a:p>
             <a:pPr algn="ctr"/>
             <a:r>
-              <a:rPr lang="en-US"/>
+              <a:rPr lang="en-US" dirty="0"/>
               <a:t>H</a:t>
             </a:r>
             <a:r>
-              <a:rPr lang="en-US" baseline="-25000"/>
+              <a:rPr lang="en-US" baseline="-25000" dirty="0"/>
               <a:t>0</a:t>
             </a:r>
             <a:r>
-              <a:rPr lang="en-US"/>
+              <a:rPr lang="en-US" dirty="0"/>
               <a:t>: </a:t>
             </a:r>
             <a:r>
-              <a:rPr lang="en-US">
+              <a:rPr lang="en-US" dirty="0">
                 <a:latin typeface="Symbol" pitchFamily="18" charset="2"/>
               </a:rPr>
               <a:t>b</a:t>
             </a:r>
             <a:r>
-              <a:rPr lang="en-US" baseline="-25000"/>
+              <a:rPr lang="en-US" baseline="-25000" dirty="0"/>
               <a:t>1</a:t>
             </a:r>
             <a:r>
-              <a:rPr lang="en-US"/>
+              <a:rPr lang="en-US" dirty="0"/>
               <a:t>=0</a:t>
             </a:r>
           </a:p>
@@ -9230,7 +9085,7 @@
         </p:nvSpPr>
         <p:spPr bwMode="auto">
           <a:xfrm>
-            <a:off x="7162800" y="3386837"/>
+            <a:off x="7010400" y="3733800"/>
             <a:ext cx="1600200" cy="609600"/>
           </a:xfrm>
           <a:prstGeom prst="borderCallout2">
@@ -9308,7 +9163,7 @@
         </p:nvSpPr>
         <p:spPr bwMode="auto">
           <a:xfrm>
-            <a:off x="609600" y="4933062"/>
+            <a:off x="152400" y="5088466"/>
             <a:ext cx="2209800" cy="609600"/>
           </a:xfrm>
           <a:prstGeom prst="borderCallout2">
@@ -9342,37 +9197,37 @@
           <a:p>
             <a:pPr algn="ctr"/>
             <a:r>
-              <a:rPr lang="en-US">
+              <a:rPr lang="en-US" dirty="0" err="1">
                 <a:latin typeface="Symbol" pitchFamily="18" charset="2"/>
               </a:rPr>
               <a:t>m</a:t>
             </a:r>
             <a:r>
-              <a:rPr lang="en-US" baseline="-25000"/>
+              <a:rPr lang="en-US" baseline="-25000" dirty="0" err="1"/>
               <a:t>Y|X</a:t>
             </a:r>
             <a:r>
-              <a:rPr lang="en-US"/>
+              <a:rPr lang="en-US" dirty="0"/>
               <a:t> = </a:t>
             </a:r>
             <a:r>
-              <a:rPr lang="en-US">
+              <a:rPr lang="en-US" dirty="0">
                 <a:latin typeface="Symbol" pitchFamily="18" charset="2"/>
               </a:rPr>
               <a:t>a</a:t>
             </a:r>
             <a:r>
-              <a:rPr lang="en-US"/>
+              <a:rPr lang="en-US" dirty="0"/>
               <a:t> =</a:t>
             </a:r>
             <a:r>
-              <a:rPr lang="en-US">
+              <a:rPr lang="en-US" dirty="0">
                 <a:latin typeface="Symbol" pitchFamily="18" charset="2"/>
               </a:rPr>
               <a:t>`</a:t>
             </a:r>
             <a:r>
-              <a:rPr lang="en-US"/>
+              <a:rPr lang="en-US" dirty="0"/>
               <a:t>y</a:t>
             </a:r>
           </a:p>
@@ -9388,7 +9243,7 @@
         </p:nvSpPr>
         <p:spPr bwMode="auto">
           <a:xfrm>
-            <a:off x="685800" y="3234437"/>
+            <a:off x="152400" y="3733800"/>
             <a:ext cx="2209800" cy="609600"/>
           </a:xfrm>
           <a:prstGeom prst="borderCallout2">
@@ -9426,79 +9281,46 @@
               </a:spcBef>
             </a:pPr>
             <a:r>
-              <a:rPr lang="en-US">
+              <a:rPr lang="en-US" dirty="0" err="1">
                 <a:latin typeface="Symbol" pitchFamily="18" charset="2"/>
               </a:rPr>
               <a:t>m</a:t>
             </a:r>
             <a:r>
-              <a:rPr lang="en-US" baseline="-25000"/>
+              <a:rPr lang="en-US" baseline="-25000" dirty="0" err="1"/>
               <a:t>Y|X</a:t>
             </a:r>
             <a:r>
-              <a:rPr lang="en-US"/>
+              <a:rPr lang="en-US" dirty="0"/>
               <a:t>=</a:t>
             </a:r>
             <a:r>
-              <a:rPr lang="en-US">
+              <a:rPr lang="en-US" dirty="0">
                 <a:latin typeface="Symbol" pitchFamily="18" charset="2"/>
               </a:rPr>
               <a:t>a</a:t>
             </a:r>
             <a:r>
-              <a:rPr lang="en-US"/>
+              <a:rPr lang="en-US" dirty="0"/>
               <a:t>+</a:t>
             </a:r>
             <a:r>
-              <a:rPr lang="en-US">
+              <a:rPr lang="en-US" dirty="0">
                 <a:latin typeface="Symbol" pitchFamily="18" charset="2"/>
               </a:rPr>
               <a:t>b</a:t>
             </a:r>
             <a:r>
-              <a:rPr lang="en-US" baseline="-25000"/>
+              <a:rPr lang="en-US" baseline="-25000" dirty="0"/>
               <a:t>1</a:t>
             </a:r>
             <a:r>
-              <a:rPr lang="en-US"/>
+              <a:rPr lang="en-US" dirty="0"/>
               <a:t>X</a:t>
             </a:r>
           </a:p>
         </p:txBody>
       </p:sp>
-      <p:pic>
-        <p:nvPicPr>
-          <p:cNvPr id="320524" name="Picture 12"/>
-          <p:cNvPicPr>
-            <a:picLocks noChangeAspect="1" noChangeArrowheads="1"/>
-          </p:cNvPicPr>
-          <p:nvPr/>
-        </p:nvPicPr>
-        <p:blipFill>
-          <a:blip r:embed="rId2"/>
-          <a:srcRect/>
-          <a:stretch>
-            <a:fillRect/>
-          </a:stretch>
-        </p:blipFill>
-        <p:spPr bwMode="auto">
-          <a:xfrm>
-            <a:off x="2895600" y="2474025"/>
-            <a:ext cx="4267200" cy="4249737"/>
-          </a:xfrm>
-          <a:prstGeom prst="rect">
-            <a:avLst/>
-          </a:prstGeom>
-          <a:noFill/>
-          <a:ln w="9525">
-            <a:noFill/>
-            <a:miter lim="800000"/>
-            <a:headEnd/>
-            <a:tailEnd/>
-          </a:ln>
-          <a:effectLst/>
-        </p:spPr>
-      </p:pic>
       <p:sp>
         <p:nvSpPr>
           <p:cNvPr id="320525" name="Text Box 13"/>
@@ -10907,6 +10729,30 @@
           <a:chExt cx="0" cy="0"/>
         </a:xfrm>
       </p:grpSpPr>
+      <p:pic>
+        <p:nvPicPr>
+          <p:cNvPr id="28" name="Picture 27"/>
+          <p:cNvPicPr>
+            <a:picLocks noChangeAspect="1"/>
+          </p:cNvPicPr>
+          <p:nvPr/>
+        </p:nvPicPr>
+        <p:blipFill>
+          <a:blip r:embed="rId2"/>
+          <a:stretch>
+            <a:fillRect/>
+          </a:stretch>
+        </p:blipFill>
+        <p:spPr>
+          <a:xfrm>
+            <a:off x="2514600" y="2667000"/>
+            <a:ext cx="4114800" cy="4114800"/>
+          </a:xfrm>
+          <a:prstGeom prst="rect">
+            <a:avLst/>
+          </a:prstGeom>
+        </p:spPr>
+      </p:pic>
       <p:sp>
         <p:nvSpPr>
           <p:cNvPr id="26" name="Footer Placeholder 3"/>
@@ -10953,39 +10799,6 @@
           </a:p>
         </p:txBody>
       </p:sp>
-      <p:pic>
-        <p:nvPicPr>
-          <p:cNvPr id="322586" name="Picture 26"/>
-          <p:cNvPicPr>
-            <a:picLocks noChangeAspect="1" noChangeArrowheads="1"/>
-          </p:cNvPicPr>
-          <p:nvPr/>
-        </p:nvPicPr>
-        <p:blipFill>
-          <a:blip r:embed="rId2"/>
-          <a:srcRect/>
-          <a:stretch>
-            <a:fillRect/>
-          </a:stretch>
-        </p:blipFill>
-        <p:spPr bwMode="auto">
-          <a:xfrm>
-            <a:off x="1981200" y="2592388"/>
-            <a:ext cx="4267200" cy="4249737"/>
-          </a:xfrm>
-          <a:prstGeom prst="rect">
-            <a:avLst/>
-          </a:prstGeom>
-          <a:noFill/>
-          <a:ln w="9525">
-            <a:noFill/>
-            <a:miter lim="800000"/>
-            <a:headEnd/>
-            <a:tailEnd/>
-          </a:ln>
-          <a:effectLst/>
-        </p:spPr>
-      </p:pic>
       <p:sp>
         <p:nvSpPr>
           <p:cNvPr id="322563" name="Rectangle 3"/>
@@ -11152,7 +10965,7 @@
       </p:sp>
       <p:sp>
         <p:nvSpPr>
-          <p:cNvPr id="322565" name="Line 5"/>
+          <p:cNvPr id="322573" name="Line 13"/>
           <p:cNvSpPr>
             <a:spLocks noChangeShapeType="1"/>
           </p:cNvSpPr>
@@ -11160,14 +10973,14 @@
         </p:nvSpPr>
         <p:spPr bwMode="auto">
           <a:xfrm flipV="1">
-            <a:off x="3905250" y="4994275"/>
-            <a:ext cx="0" cy="476250"/>
+            <a:off x="6400800" y="3505200"/>
+            <a:ext cx="0" cy="127000"/>
           </a:xfrm>
           <a:prstGeom prst="line">
             <a:avLst/>
           </a:prstGeom>
           <a:noFill/>
-          <a:ln w="25400" cap="rnd">
+          <a:ln w="31750" cap="rnd">
             <a:solidFill>
               <a:schemeClr val="accent2"/>
             </a:solidFill>
@@ -11188,7 +11001,7 @@
       </p:sp>
       <p:sp>
         <p:nvSpPr>
-          <p:cNvPr id="322566" name="Line 6"/>
+          <p:cNvPr id="322577" name="Line 17"/>
           <p:cNvSpPr>
             <a:spLocks noChangeShapeType="1"/>
           </p:cNvSpPr>
@@ -11196,14 +11009,50 @@
         </p:nvSpPr>
         <p:spPr bwMode="auto">
           <a:xfrm flipV="1">
-            <a:off x="4019550" y="4864100"/>
-            <a:ext cx="0" cy="107950"/>
+            <a:off x="6400800" y="3666067"/>
+            <a:ext cx="6350" cy="1210732"/>
           </a:xfrm>
           <a:prstGeom prst="line">
             <a:avLst/>
           </a:prstGeom>
           <a:noFill/>
-          <a:ln w="25400" cap="rnd">
+          <a:ln w="31750" cap="rnd">
+            <a:solidFill>
+              <a:srgbClr val="FF0000"/>
+            </a:solidFill>
+            <a:prstDash val="sysDot"/>
+            <a:round/>
+            <a:headEnd/>
+            <a:tailEnd/>
+          </a:ln>
+          <a:effectLst/>
+        </p:spPr>
+        <p:txBody>
+          <a:bodyPr/>
+          <a:lstStyle/>
+          <a:p>
+            <a:endParaRPr lang="en-US"/>
+          </a:p>
+        </p:txBody>
+      </p:sp>
+      <p:sp>
+        <p:nvSpPr>
+          <p:cNvPr id="29" name="Line 13"/>
+          <p:cNvSpPr>
+            <a:spLocks noChangeShapeType="1"/>
+          </p:cNvSpPr>
+          <p:nvPr/>
+        </p:nvSpPr>
+        <p:spPr bwMode="auto">
+          <a:xfrm flipV="1">
+            <a:off x="5757330" y="3826932"/>
+            <a:ext cx="0" cy="127000"/>
+          </a:xfrm>
+          <a:prstGeom prst="line">
+            <a:avLst/>
+          </a:prstGeom>
+          <a:noFill/>
+          <a:ln w="31750" cap="rnd">
             <a:solidFill>
               <a:schemeClr val="accent2"/>
             </a:solidFill>
@@ -11224,7 +11073,7 @@
       </p:sp>
       <p:sp>
         <p:nvSpPr>
-          <p:cNvPr id="322567" name="Line 7"/>
+          <p:cNvPr id="30" name="Line 13"/>
           <p:cNvSpPr>
             <a:spLocks noChangeShapeType="1"/>
           </p:cNvSpPr>
@@ -11232,14 +11081,14 @@
         </p:nvSpPr>
         <p:spPr bwMode="auto">
           <a:xfrm flipV="1">
-            <a:off x="3619500" y="5257800"/>
-            <a:ext cx="0" cy="203200"/>
+            <a:off x="5613402" y="2904066"/>
+            <a:ext cx="0" cy="1143000"/>
           </a:xfrm>
           <a:prstGeom prst="line">
             <a:avLst/>
           </a:prstGeom>
           <a:noFill/>
-          <a:ln w="25400" cap="rnd">
+          <a:ln w="31750" cap="rnd">
             <a:solidFill>
               <a:schemeClr val="accent2"/>
             </a:solidFill>
@@ -11260,7 +11109,7 @@
       </p:sp>
       <p:sp>
         <p:nvSpPr>
-          <p:cNvPr id="322568" name="Line 8"/>
+          <p:cNvPr id="31" name="Line 13"/>
           <p:cNvSpPr>
             <a:spLocks noChangeShapeType="1"/>
           </p:cNvSpPr>
@@ -11268,14 +11117,14 @@
         </p:nvSpPr>
         <p:spPr bwMode="auto">
           <a:xfrm flipV="1">
-            <a:off x="3648075" y="4940300"/>
-            <a:ext cx="0" cy="292100"/>
+            <a:off x="4699002" y="4360332"/>
+            <a:ext cx="0" cy="457200"/>
           </a:xfrm>
           <a:prstGeom prst="line">
             <a:avLst/>
           </a:prstGeom>
           <a:noFill/>
-          <a:ln w="25400" cap="rnd">
+          <a:ln w="31750" cap="rnd">
             <a:solidFill>
               <a:schemeClr val="accent2"/>
             </a:solidFill>
@@ -11296,7 +11145,7 @@
       </p:sp>
       <p:sp>
         <p:nvSpPr>
-          <p:cNvPr id="322569" name="Line 9"/>
+          <p:cNvPr id="32" name="Line 13"/>
           <p:cNvSpPr>
             <a:spLocks noChangeShapeType="1"/>
           </p:cNvSpPr>
@@ -11304,14 +11153,14 @@
         </p:nvSpPr>
         <p:spPr bwMode="auto">
           <a:xfrm flipV="1">
-            <a:off x="3200400" y="5435600"/>
-            <a:ext cx="0" cy="209550"/>
+            <a:off x="5778495" y="4038600"/>
+            <a:ext cx="0" cy="990600"/>
           </a:xfrm>
           <a:prstGeom prst="line">
             <a:avLst/>
           </a:prstGeom>
           <a:noFill/>
-          <a:ln w="25400" cap="rnd">
+          <a:ln w="31750" cap="rnd">
             <a:solidFill>
               <a:schemeClr val="accent2"/>
             </a:solidFill>
@@ -11332,7 +11181,7 @@
       </p:sp>
       <p:sp>
         <p:nvSpPr>
-          <p:cNvPr id="322570" name="Line 10"/>
+          <p:cNvPr id="33" name="Line 13"/>
           <p:cNvSpPr>
             <a:spLocks noChangeShapeType="1"/>
           </p:cNvSpPr>
@@ -11340,14 +11189,14 @@
         </p:nvSpPr>
         <p:spPr bwMode="auto">
           <a:xfrm flipV="1">
-            <a:off x="3140075" y="5740400"/>
-            <a:ext cx="0" cy="95250"/>
+            <a:off x="4191000" y="5257800"/>
+            <a:ext cx="0" cy="838200"/>
           </a:xfrm>
           <a:prstGeom prst="line">
             <a:avLst/>
           </a:prstGeom>
           <a:noFill/>
-          <a:ln w="25400" cap="rnd">
+          <a:ln w="31750" cap="rnd">
             <a:solidFill>
               <a:schemeClr val="accent2"/>
             </a:solidFill>
@@ -11368,7 +11217,7 @@
       </p:sp>
       <p:sp>
         <p:nvSpPr>
-          <p:cNvPr id="322571" name="Line 11"/>
+          <p:cNvPr id="34" name="Line 13"/>
           <p:cNvSpPr>
             <a:spLocks noChangeShapeType="1"/>
           </p:cNvSpPr>
@@ -11376,14 +11225,14 @@
         </p:nvSpPr>
         <p:spPr bwMode="auto">
           <a:xfrm flipV="1">
-            <a:off x="2978150" y="5807075"/>
-            <a:ext cx="0" cy="95250"/>
+            <a:off x="3810000" y="5562599"/>
+            <a:ext cx="0" cy="169333"/>
           </a:xfrm>
           <a:prstGeom prst="line">
             <a:avLst/>
           </a:prstGeom>
           <a:noFill/>
-          <a:ln w="25400" cap="rnd">
+          <a:ln w="31750" cap="rnd">
             <a:solidFill>
               <a:schemeClr val="accent2"/>
             </a:solidFill>
@@ -11404,7 +11253,7 @@
       </p:sp>
       <p:sp>
         <p:nvSpPr>
-          <p:cNvPr id="322572" name="Line 12"/>
+          <p:cNvPr id="35" name="Line 13"/>
           <p:cNvSpPr>
             <a:spLocks noChangeShapeType="1"/>
           </p:cNvSpPr>
@@ -11412,14 +11261,14 @@
         </p:nvSpPr>
         <p:spPr bwMode="auto">
           <a:xfrm flipV="1">
-            <a:off x="5486400" y="3378200"/>
-            <a:ext cx="0" cy="203200"/>
+            <a:off x="3352800" y="5647264"/>
+            <a:ext cx="0" cy="220135"/>
           </a:xfrm>
           <a:prstGeom prst="line">
             <a:avLst/>
           </a:prstGeom>
           <a:noFill/>
-          <a:ln w="25400" cap="rnd">
+          <a:ln w="31750" cap="rnd">
             <a:solidFill>
               <a:schemeClr val="accent2"/>
             </a:solidFill>
@@ -11440,7 +11289,7 @@
       </p:sp>
       <p:sp>
         <p:nvSpPr>
-          <p:cNvPr id="322573" name="Line 13"/>
+          <p:cNvPr id="36" name="Line 17"/>
           <p:cNvSpPr>
             <a:spLocks noChangeShapeType="1"/>
           </p:cNvSpPr>
@@ -11448,86 +11297,14 @@
         </p:nvSpPr>
         <p:spPr bwMode="auto">
           <a:xfrm flipV="1">
-            <a:off x="5883275" y="2965450"/>
-            <a:ext cx="0" cy="203200"/>
+            <a:off x="5757329" y="3754964"/>
+            <a:ext cx="3175" cy="1121835"/>
           </a:xfrm>
           <a:prstGeom prst="line">
             <a:avLst/>
           </a:prstGeom>
           <a:noFill/>
-          <a:ln w="25400" cap="rnd">
-            <a:solidFill>
-              <a:schemeClr val="accent2"/>
-            </a:solidFill>
-            <a:prstDash val="sysDot"/>
-            <a:round/>
-            <a:headEnd/>
-            <a:tailEnd/>
-          </a:ln>
-          <a:effectLst/>
-        </p:spPr>
-        <p:txBody>
-          <a:bodyPr/>
-          <a:lstStyle/>
-          <a:p>
-            <a:endParaRPr lang="en-US"/>
-          </a:p>
-        </p:txBody>
-      </p:sp>
-      <p:sp>
-        <p:nvSpPr>
-          <p:cNvPr id="322574" name="Line 14"/>
-          <p:cNvSpPr>
-            <a:spLocks noChangeShapeType="1"/>
-          </p:cNvSpPr>
-          <p:nvPr/>
-        </p:nvSpPr>
-        <p:spPr bwMode="auto">
-          <a:xfrm flipH="1" flipV="1">
-            <a:off x="5156200" y="2959100"/>
-            <a:ext cx="6350" cy="741363"/>
-          </a:xfrm>
-          <a:prstGeom prst="line">
-            <a:avLst/>
-          </a:prstGeom>
-          <a:noFill/>
-          <a:ln w="25400" cap="rnd">
-            <a:solidFill>
-              <a:schemeClr val="accent2"/>
-            </a:solidFill>
-            <a:prstDash val="sysDot"/>
-            <a:round/>
-            <a:headEnd/>
-            <a:tailEnd/>
-          </a:ln>
-          <a:effectLst/>
-        </p:spPr>
-        <p:txBody>
-          <a:bodyPr/>
-          <a:lstStyle/>
-          <a:p>
-            <a:endParaRPr lang="en-US"/>
-          </a:p>
-        </p:txBody>
-      </p:sp>
-      <p:sp>
-        <p:nvSpPr>
-          <p:cNvPr id="322575" name="Line 15"/>
-          <p:cNvSpPr>
-            <a:spLocks noChangeShapeType="1"/>
-          </p:cNvSpPr>
-          <p:nvPr/>
-        </p:nvSpPr>
-        <p:spPr bwMode="auto">
-          <a:xfrm flipV="1">
-            <a:off x="5154613" y="2947988"/>
-            <a:ext cx="3175" cy="1854200"/>
-          </a:xfrm>
-          <a:prstGeom prst="line">
-            <a:avLst/>
-          </a:prstGeom>
-          <a:noFill/>
-          <a:ln w="25400" cap="rnd">
+          <a:ln w="31750" cap="rnd">
             <a:solidFill>
               <a:srgbClr val="FF0000"/>
             </a:solidFill>
@@ -11548,7 +11325,7 @@
       </p:sp>
       <p:sp>
         <p:nvSpPr>
-          <p:cNvPr id="322576" name="Line 16"/>
+          <p:cNvPr id="37" name="Line 17"/>
           <p:cNvSpPr>
             <a:spLocks noChangeShapeType="1"/>
           </p:cNvSpPr>
@@ -11556,14 +11333,14 @@
         </p:nvSpPr>
         <p:spPr bwMode="auto">
           <a:xfrm flipV="1">
-            <a:off x="5486400" y="3581400"/>
-            <a:ext cx="3175" cy="1228725"/>
+            <a:off x="5775322" y="4876798"/>
+            <a:ext cx="3173" cy="173566"/>
           </a:xfrm>
           <a:prstGeom prst="line">
             <a:avLst/>
           </a:prstGeom>
           <a:noFill/>
-          <a:ln w="25400" cap="rnd">
+          <a:ln w="31750" cap="rnd">
             <a:solidFill>
               <a:srgbClr val="FF0000"/>
             </a:solidFill>
@@ -11584,7 +11361,7 @@
       </p:sp>
       <p:sp>
         <p:nvSpPr>
-          <p:cNvPr id="322577" name="Line 17"/>
+          <p:cNvPr id="38" name="Line 17"/>
           <p:cNvSpPr>
             <a:spLocks noChangeShapeType="1"/>
           </p:cNvSpPr>
@@ -11592,14 +11369,14 @@
         </p:nvSpPr>
         <p:spPr bwMode="auto">
           <a:xfrm flipV="1">
-            <a:off x="5876925" y="3143250"/>
-            <a:ext cx="6350" cy="1663700"/>
+            <a:off x="4699000" y="4360332"/>
+            <a:ext cx="2" cy="516466"/>
           </a:xfrm>
           <a:prstGeom prst="line">
             <a:avLst/>
           </a:prstGeom>
           <a:noFill/>
-          <a:ln w="25400" cap="rnd">
+          <a:ln w="31750" cap="rnd">
             <a:solidFill>
               <a:srgbClr val="FF0000"/>
             </a:solidFill>
@@ -11620,7 +11397,7 @@
       </p:sp>
       <p:sp>
         <p:nvSpPr>
-          <p:cNvPr id="322578" name="Line 18"/>
+          <p:cNvPr id="39" name="Line 17"/>
           <p:cNvSpPr>
             <a:spLocks noChangeShapeType="1"/>
           </p:cNvSpPr>
@@ -11628,14 +11405,14 @@
         </p:nvSpPr>
         <p:spPr bwMode="auto">
           <a:xfrm flipV="1">
-            <a:off x="4019550" y="4810125"/>
-            <a:ext cx="6350" cy="165100"/>
+            <a:off x="5595411" y="2865965"/>
+            <a:ext cx="15874" cy="2010832"/>
           </a:xfrm>
           <a:prstGeom prst="line">
             <a:avLst/>
           </a:prstGeom>
           <a:noFill/>
-          <a:ln w="25400" cap="rnd">
+          <a:ln w="31750" cap="rnd">
             <a:solidFill>
               <a:srgbClr val="FF0000"/>
             </a:solidFill>
@@ -11656,22 +11433,22 @@
       </p:sp>
       <p:sp>
         <p:nvSpPr>
-          <p:cNvPr id="322579" name="Line 19"/>
+          <p:cNvPr id="40" name="Line 17"/>
           <p:cNvSpPr>
             <a:spLocks noChangeShapeType="1"/>
           </p:cNvSpPr>
           <p:nvPr/>
         </p:nvSpPr>
         <p:spPr bwMode="auto">
-          <a:xfrm flipH="1" flipV="1">
-            <a:off x="3895725" y="4813300"/>
-            <a:ext cx="6350" cy="673100"/>
+          <a:xfrm flipV="1">
+            <a:off x="4191000" y="4876796"/>
+            <a:ext cx="0" cy="1219203"/>
           </a:xfrm>
           <a:prstGeom prst="line">
             <a:avLst/>
           </a:prstGeom>
           <a:noFill/>
-          <a:ln w="25400" cap="rnd">
+          <a:ln w="31750" cap="rnd">
             <a:solidFill>
               <a:srgbClr val="FF0000"/>
             </a:solidFill>
@@ -11692,22 +11469,22 @@
       </p:sp>
       <p:sp>
         <p:nvSpPr>
-          <p:cNvPr id="322580" name="Line 20"/>
+          <p:cNvPr id="41" name="Line 17"/>
           <p:cNvSpPr>
             <a:spLocks noChangeShapeType="1"/>
           </p:cNvSpPr>
           <p:nvPr/>
         </p:nvSpPr>
         <p:spPr bwMode="auto">
-          <a:xfrm flipH="1" flipV="1">
-            <a:off x="3714750" y="4813300"/>
-            <a:ext cx="0" cy="355600"/>
+          <a:xfrm flipV="1">
+            <a:off x="4000497" y="4881028"/>
+            <a:ext cx="6350" cy="457207"/>
           </a:xfrm>
           <a:prstGeom prst="line">
             <a:avLst/>
           </a:prstGeom>
           <a:noFill/>
-          <a:ln w="25400" cap="rnd">
+          <a:ln w="31750" cap="rnd">
             <a:solidFill>
               <a:srgbClr val="FF0000"/>
             </a:solidFill>
@@ -11728,22 +11505,22 @@
       </p:sp>
       <p:sp>
         <p:nvSpPr>
-          <p:cNvPr id="322581" name="Line 21"/>
+          <p:cNvPr id="42" name="Line 17"/>
           <p:cNvSpPr>
             <a:spLocks noChangeShapeType="1"/>
           </p:cNvSpPr>
           <p:nvPr/>
         </p:nvSpPr>
         <p:spPr bwMode="auto">
-          <a:xfrm flipH="1" flipV="1">
-            <a:off x="3622675" y="4772025"/>
-            <a:ext cx="6350" cy="673100"/>
+          <a:xfrm flipV="1">
+            <a:off x="3820574" y="4876795"/>
+            <a:ext cx="4245" cy="829737"/>
           </a:xfrm>
           <a:prstGeom prst="line">
             <a:avLst/>
           </a:prstGeom>
           <a:noFill/>
-          <a:ln w="25400" cap="rnd">
+          <a:ln w="31750" cap="rnd">
             <a:solidFill>
               <a:srgbClr val="FF0000"/>
             </a:solidFill>
@@ -11764,22 +11541,22 @@
       </p:sp>
       <p:sp>
         <p:nvSpPr>
-          <p:cNvPr id="322582" name="Line 22"/>
+          <p:cNvPr id="43" name="Line 17"/>
           <p:cNvSpPr>
             <a:spLocks noChangeShapeType="1"/>
           </p:cNvSpPr>
           <p:nvPr/>
         </p:nvSpPr>
         <p:spPr bwMode="auto">
-          <a:xfrm flipH="1" flipV="1">
-            <a:off x="3663950" y="4826000"/>
-            <a:ext cx="0" cy="107950"/>
+          <a:xfrm flipV="1">
+            <a:off x="3363374" y="4876794"/>
+            <a:ext cx="14819" cy="770474"/>
           </a:xfrm>
           <a:prstGeom prst="line">
             <a:avLst/>
           </a:prstGeom>
           <a:noFill/>
-          <a:ln w="25400" cap="rnd">
+          <a:ln w="31750" cap="rnd">
             <a:solidFill>
               <a:srgbClr val="FF0000"/>
             </a:solidFill>
@@ -11800,7 +11577,7 @@
       </p:sp>
       <p:sp>
         <p:nvSpPr>
-          <p:cNvPr id="322583" name="Line 23"/>
+          <p:cNvPr id="44" name="Line 17"/>
           <p:cNvSpPr>
             <a:spLocks noChangeShapeType="1"/>
           </p:cNvSpPr>
@@ -11808,86 +11585,14 @@
         </p:nvSpPr>
         <p:spPr bwMode="auto">
           <a:xfrm flipH="1" flipV="1">
-            <a:off x="3200400" y="4816475"/>
-            <a:ext cx="6350" cy="628650"/>
+            <a:off x="3190882" y="4868328"/>
+            <a:ext cx="5284" cy="1143006"/>
           </a:xfrm>
           <a:prstGeom prst="line">
             <a:avLst/>
           </a:prstGeom>
           <a:noFill/>
-          <a:ln w="25400" cap="rnd">
-            <a:solidFill>
-              <a:srgbClr val="FF0000"/>
-            </a:solidFill>
-            <a:prstDash val="sysDot"/>
-            <a:round/>
-            <a:headEnd/>
-            <a:tailEnd/>
-          </a:ln>
-          <a:effectLst/>
-        </p:spPr>
-        <p:txBody>
-          <a:bodyPr/>
-          <a:lstStyle/>
-          <a:p>
-            <a:endParaRPr lang="en-US"/>
-          </a:p>
-        </p:txBody>
-      </p:sp>
-      <p:sp>
-        <p:nvSpPr>
-          <p:cNvPr id="322584" name="Line 24"/>
-          <p:cNvSpPr>
-            <a:spLocks noChangeShapeType="1"/>
-          </p:cNvSpPr>
-          <p:nvPr/>
-        </p:nvSpPr>
-        <p:spPr bwMode="auto">
-          <a:xfrm flipH="1" flipV="1">
-            <a:off x="3130550" y="4810125"/>
-            <a:ext cx="19050" cy="1035050"/>
-          </a:xfrm>
-          <a:prstGeom prst="line">
-            <a:avLst/>
-          </a:prstGeom>
-          <a:noFill/>
-          <a:ln w="25400" cap="rnd">
-            <a:solidFill>
-              <a:srgbClr val="FF0000"/>
-            </a:solidFill>
-            <a:prstDash val="sysDot"/>
-            <a:round/>
-            <a:headEnd/>
-            <a:tailEnd/>
-          </a:ln>
-          <a:effectLst/>
-        </p:spPr>
-        <p:txBody>
-          <a:bodyPr/>
-          <a:lstStyle/>
-          <a:p>
-            <a:endParaRPr lang="en-US"/>
-          </a:p>
-        </p:txBody>
-      </p:sp>
-      <p:sp>
-        <p:nvSpPr>
-          <p:cNvPr id="322585" name="Line 25"/>
-          <p:cNvSpPr>
-            <a:spLocks noChangeShapeType="1"/>
-          </p:cNvSpPr>
-          <p:nvPr/>
-        </p:nvSpPr>
-        <p:spPr bwMode="auto">
-          <a:xfrm flipH="1" flipV="1">
-            <a:off x="2971800" y="4803775"/>
-            <a:ext cx="6350" cy="977900"/>
-          </a:xfrm>
-          <a:prstGeom prst="line">
-            <a:avLst/>
-          </a:prstGeom>
-          <a:noFill/>
-          <a:ln w="25400" cap="rnd">
+          <a:ln w="31750" cap="rnd">
             <a:solidFill>
               <a:srgbClr val="FF0000"/>
             </a:solidFill>
@@ -11945,7 +11650,7 @@
                                           </p:stCondLst>
                                         </p:cTn>
                                         <p:tgtEl>
-                                          <p:spTgt spid="322565"/>
+                                          <p:spTgt spid="322573"/>
                                         </p:tgtEl>
                                         <p:attrNameLst>
                                           <p:attrName>style.visibility</p:attrName>
@@ -11959,7 +11664,7 @@
                                       <p:cBhvr>
                                         <p:cTn id="7" dur="500"/>
                                         <p:tgtEl>
-                                          <p:spTgt spid="322565"/>
+                                          <p:spTgt spid="322573"/>
                                         </p:tgtEl>
                                       </p:cBhvr>
                                     </p:animEffect>
@@ -11989,7 +11694,7 @@
                                           </p:stCondLst>
                                         </p:cTn>
                                         <p:tgtEl>
-                                          <p:spTgt spid="322566"/>
+                                          <p:spTgt spid="32"/>
                                         </p:tgtEl>
                                         <p:attrNameLst>
                                           <p:attrName>style.visibility</p:attrName>
@@ -12003,7 +11708,7 @@
                                       <p:cBhvr>
                                         <p:cTn id="11" dur="500"/>
                                         <p:tgtEl>
-                                          <p:spTgt spid="322566"/>
+                                          <p:spTgt spid="32"/>
                                         </p:tgtEl>
                                       </p:cBhvr>
                                     </p:animEffect>
@@ -12020,7 +11725,7 @@
                             </p:stCondLst>
                             <p:childTnLst>
                               <p:par>
-                                <p:cTn id="13" presetID="22" presetClass="entr" presetSubtype="4" fill="hold" grpId="0" nodeType="afterEffect">
+                                <p:cTn id="13" presetID="22" presetClass="entr" presetSubtype="1" fill="hold" grpId="0" nodeType="afterEffect">
                                   <p:stCondLst>
                                     <p:cond delay="0"/>
                                   </p:stCondLst>
@@ -12033,7 +11738,7 @@
                                           </p:stCondLst>
                                         </p:cTn>
                                         <p:tgtEl>
-                                          <p:spTgt spid="322567"/>
+                                          <p:spTgt spid="29"/>
                                         </p:tgtEl>
                                         <p:attrNameLst>
                                           <p:attrName>style.visibility</p:attrName>
@@ -12043,11 +11748,11 @@
                                         <p:strVal val="visible"/>
                                       </p:to>
                                     </p:set>
-                                    <p:animEffect transition="in" filter="wipe(down)">
+                                    <p:animEffect transition="in" filter="wipe(up)">
                                       <p:cBhvr>
                                         <p:cTn id="15" dur="500"/>
                                         <p:tgtEl>
-                                          <p:spTgt spid="322567"/>
+                                          <p:spTgt spid="29"/>
                                         </p:tgtEl>
                                       </p:cBhvr>
                                     </p:animEffect>
@@ -12077,7 +11782,7 @@
                                           </p:stCondLst>
                                         </p:cTn>
                                         <p:tgtEl>
-                                          <p:spTgt spid="322568"/>
+                                          <p:spTgt spid="30"/>
                                         </p:tgtEl>
                                         <p:attrNameLst>
                                           <p:attrName>style.visibility</p:attrName>
@@ -12091,7 +11796,7 @@
                                       <p:cBhvr>
                                         <p:cTn id="19" dur="500"/>
                                         <p:tgtEl>
-                                          <p:spTgt spid="322568"/>
+                                          <p:spTgt spid="30"/>
                                         </p:tgtEl>
                                       </p:cBhvr>
                                     </p:animEffect>
@@ -12121,7 +11826,7 @@
                                           </p:stCondLst>
                                         </p:cTn>
                                         <p:tgtEl>
-                                          <p:spTgt spid="322569"/>
+                                          <p:spTgt spid="31"/>
                                         </p:tgtEl>
                                         <p:attrNameLst>
                                           <p:attrName>style.visibility</p:attrName>
@@ -12135,7 +11840,7 @@
                                       <p:cBhvr>
                                         <p:cTn id="23" dur="500"/>
                                         <p:tgtEl>
-                                          <p:spTgt spid="322569"/>
+                                          <p:spTgt spid="31"/>
                                         </p:tgtEl>
                                       </p:cBhvr>
                                     </p:animEffect>
@@ -12165,7 +11870,7 @@
                                           </p:stCondLst>
                                         </p:cTn>
                                         <p:tgtEl>
-                                          <p:spTgt spid="322570"/>
+                                          <p:spTgt spid="33"/>
                                         </p:tgtEl>
                                         <p:attrNameLst>
                                           <p:attrName>style.visibility</p:attrName>
@@ -12179,7 +11884,7 @@
                                       <p:cBhvr>
                                         <p:cTn id="27" dur="500"/>
                                         <p:tgtEl>
-                                          <p:spTgt spid="322570"/>
+                                          <p:spTgt spid="33"/>
                                         </p:tgtEl>
                                       </p:cBhvr>
                                     </p:animEffect>
@@ -12196,7 +11901,7 @@
                             </p:stCondLst>
                             <p:childTnLst>
                               <p:par>
-                                <p:cTn id="29" presetID="22" presetClass="entr" presetSubtype="1" fill="hold" grpId="0" nodeType="afterEffect">
+                                <p:cTn id="29" presetID="22" presetClass="entr" presetSubtype="4" fill="hold" grpId="0" nodeType="afterEffect">
                                   <p:stCondLst>
                                     <p:cond delay="0"/>
                                   </p:stCondLst>
@@ -12209,7 +11914,7 @@
                                           </p:stCondLst>
                                         </p:cTn>
                                         <p:tgtEl>
-                                          <p:spTgt spid="322571"/>
+                                          <p:spTgt spid="34"/>
                                         </p:tgtEl>
                                         <p:attrNameLst>
                                           <p:attrName>style.visibility</p:attrName>
@@ -12219,11 +11924,11 @@
                                         <p:strVal val="visible"/>
                                       </p:to>
                                     </p:set>
-                                    <p:animEffect transition="in" filter="wipe(up)">
+                                    <p:animEffect transition="in" filter="wipe(down)">
                                       <p:cBhvr>
                                         <p:cTn id="31" dur="500"/>
                                         <p:tgtEl>
-                                          <p:spTgt spid="322571"/>
+                                          <p:spTgt spid="34"/>
                                         </p:tgtEl>
                                       </p:cBhvr>
                                     </p:animEffect>
@@ -12253,7 +11958,7 @@
                                           </p:stCondLst>
                                         </p:cTn>
                                         <p:tgtEl>
-                                          <p:spTgt spid="322572"/>
+                                          <p:spTgt spid="35"/>
                                         </p:tgtEl>
                                         <p:attrNameLst>
                                           <p:attrName>style.visibility</p:attrName>
@@ -12267,95 +11972,7 @@
                                       <p:cBhvr>
                                         <p:cTn id="35" dur="500"/>
                                         <p:tgtEl>
-                                          <p:spTgt spid="322572"/>
-                                        </p:tgtEl>
-                                      </p:cBhvr>
-                                    </p:animEffect>
-                                  </p:childTnLst>
-                                </p:cTn>
-                              </p:par>
-                            </p:childTnLst>
-                          </p:cTn>
-                        </p:par>
-                        <p:par>
-                          <p:cTn id="36" fill="hold">
-                            <p:stCondLst>
-                              <p:cond delay="4000"/>
-                            </p:stCondLst>
-                            <p:childTnLst>
-                              <p:par>
-                                <p:cTn id="37" presetID="22" presetClass="entr" presetSubtype="4" fill="hold" grpId="0" nodeType="afterEffect">
-                                  <p:stCondLst>
-                                    <p:cond delay="0"/>
-                                  </p:stCondLst>
-                                  <p:childTnLst>
-                                    <p:set>
-                                      <p:cBhvr>
-                                        <p:cTn id="38" dur="1" fill="hold">
-                                          <p:stCondLst>
-                                            <p:cond delay="0"/>
-                                          </p:stCondLst>
-                                        </p:cTn>
-                                        <p:tgtEl>
-                                          <p:spTgt spid="322573"/>
-                                        </p:tgtEl>
-                                        <p:attrNameLst>
-                                          <p:attrName>style.visibility</p:attrName>
-                                        </p:attrNameLst>
-                                      </p:cBhvr>
-                                      <p:to>
-                                        <p:strVal val="visible"/>
-                                      </p:to>
-                                    </p:set>
-                                    <p:animEffect transition="in" filter="wipe(down)">
-                                      <p:cBhvr>
-                                        <p:cTn id="39" dur="500"/>
-                                        <p:tgtEl>
-                                          <p:spTgt spid="322573"/>
-                                        </p:tgtEl>
-                                      </p:cBhvr>
-                                    </p:animEffect>
-                                  </p:childTnLst>
-                                </p:cTn>
-                              </p:par>
-                            </p:childTnLst>
-                          </p:cTn>
-                        </p:par>
-                        <p:par>
-                          <p:cTn id="40" fill="hold">
-                            <p:stCondLst>
-                              <p:cond delay="4500"/>
-                            </p:stCondLst>
-                            <p:childTnLst>
-                              <p:par>
-                                <p:cTn id="41" presetID="22" presetClass="entr" presetSubtype="1" fill="hold" grpId="0" nodeType="afterEffect">
-                                  <p:stCondLst>
-                                    <p:cond delay="0"/>
-                                  </p:stCondLst>
-                                  <p:childTnLst>
-                                    <p:set>
-                                      <p:cBhvr>
-                                        <p:cTn id="42" dur="1" fill="hold">
-                                          <p:stCondLst>
-                                            <p:cond delay="0"/>
-                                          </p:stCondLst>
-                                        </p:cTn>
-                                        <p:tgtEl>
-                                          <p:spTgt spid="322574"/>
-                                        </p:tgtEl>
-                                        <p:attrNameLst>
-                                          <p:attrName>style.visibility</p:attrName>
-                                        </p:attrNameLst>
-                                      </p:cBhvr>
-                                      <p:to>
-                                        <p:strVal val="visible"/>
-                                      </p:to>
-                                    </p:set>
-                                    <p:animEffect transition="in" filter="wipe(up)">
-                                      <p:cBhvr>
-                                        <p:cTn id="43" dur="500"/>
-                                        <p:tgtEl>
-                                          <p:spTgt spid="322574"/>
+                                          <p:spTgt spid="35"/>
                                         </p:tgtEl>
                                       </p:cBhvr>
                                     </p:animEffect>
@@ -12369,19 +11986,120 @@
                     </p:cTn>
                   </p:par>
                   <p:par>
-                    <p:cTn id="44" fill="hold">
+                    <p:cTn id="36" fill="hold">
                       <p:stCondLst>
                         <p:cond delay="indefinite"/>
                       </p:stCondLst>
                       <p:childTnLst>
                         <p:par>
-                          <p:cTn id="45" fill="hold">
+                          <p:cTn id="37" fill="hold">
                             <p:stCondLst>
                               <p:cond delay="0"/>
                             </p:stCondLst>
                             <p:childTnLst>
                               <p:par>
-                                <p:cTn id="46" presetID="9" presetClass="exit" presetSubtype="0" fill="hold" grpId="1" nodeType="clickEffect">
+                                <p:cTn id="38" presetID="1" presetClass="entr" presetSubtype="0" fill="hold" grpId="0" nodeType="clickEffect">
+                                  <p:stCondLst>
+                                    <p:cond delay="0"/>
+                                  </p:stCondLst>
+                                  <p:childTnLst>
+                                    <p:set>
+                                      <p:cBhvr>
+                                        <p:cTn id="39" dur="1" fill="hold">
+                                          <p:stCondLst>
+                                            <p:cond delay="0"/>
+                                          </p:stCondLst>
+                                        </p:cTn>
+                                        <p:tgtEl>
+                                          <p:spTgt spid="322564">
+                                            <p:txEl>
+                                              <p:pRg st="2" end="2"/>
+                                            </p:txEl>
+                                          </p:spTgt>
+                                        </p:tgtEl>
+                                        <p:attrNameLst>
+                                          <p:attrName>style.visibility</p:attrName>
+                                        </p:attrNameLst>
+                                      </p:cBhvr>
+                                      <p:to>
+                                        <p:strVal val="visible"/>
+                                      </p:to>
+                                    </p:set>
+                                  </p:childTnLst>
+                                </p:cTn>
+                              </p:par>
+                              <p:par>
+                                <p:cTn id="40" presetID="9" presetClass="exit" presetSubtype="0" fill="hold" grpId="1" nodeType="withEffect">
+                                  <p:stCondLst>
+                                    <p:cond delay="0"/>
+                                  </p:stCondLst>
+                                  <p:childTnLst>
+                                    <p:animEffect transition="out" filter="dissolve">
+                                      <p:cBhvr>
+                                        <p:cTn id="41" dur="500"/>
+                                        <p:tgtEl>
+                                          <p:spTgt spid="322573"/>
+                                        </p:tgtEl>
+                                      </p:cBhvr>
+                                    </p:animEffect>
+                                    <p:set>
+                                      <p:cBhvr>
+                                        <p:cTn id="42" dur="1" fill="hold">
+                                          <p:stCondLst>
+                                            <p:cond delay="499"/>
+                                          </p:stCondLst>
+                                        </p:cTn>
+                                        <p:tgtEl>
+                                          <p:spTgt spid="322573"/>
+                                        </p:tgtEl>
+                                        <p:attrNameLst>
+                                          <p:attrName>style.visibility</p:attrName>
+                                        </p:attrNameLst>
+                                      </p:cBhvr>
+                                      <p:to>
+                                        <p:strVal val="hidden"/>
+                                      </p:to>
+                                    </p:set>
+                                  </p:childTnLst>
+                                </p:cTn>
+                              </p:par>
+                              <p:par>
+                                <p:cTn id="43" presetID="9" presetClass="exit" presetSubtype="0" fill="hold" grpId="1" nodeType="withEffect">
+                                  <p:stCondLst>
+                                    <p:cond delay="0"/>
+                                  </p:stCondLst>
+                                  <p:childTnLst>
+                                    <p:animEffect transition="out" filter="dissolve">
+                                      <p:cBhvr>
+                                        <p:cTn id="44" dur="500"/>
+                                        <p:tgtEl>
+                                          <p:spTgt spid="29"/>
+                                        </p:tgtEl>
+                                      </p:cBhvr>
+                                    </p:animEffect>
+                                    <p:set>
+                                      <p:cBhvr>
+                                        <p:cTn id="45" dur="1" fill="hold">
+                                          <p:stCondLst>
+                                            <p:cond delay="499"/>
+                                          </p:stCondLst>
+                                        </p:cTn>
+                                        <p:tgtEl>
+                                          <p:spTgt spid="29"/>
+                                        </p:tgtEl>
+                                        <p:attrNameLst>
+                                          <p:attrName>style.visibility</p:attrName>
+                                        </p:attrNameLst>
+                                      </p:cBhvr>
+                                      <p:to>
+                                        <p:strVal val="hidden"/>
+                                      </p:to>
+                                    </p:set>
+                                  </p:childTnLst>
+                                </p:cTn>
+                              </p:par>
+                              <p:par>
+                                <p:cTn id="46" presetID="9" presetClass="exit" presetSubtype="0" fill="hold" grpId="1" nodeType="withEffect">
                                   <p:stCondLst>
                                     <p:cond delay="0"/>
                                   </p:stCondLst>
@@ -12390,7 +12108,7 @@
                                       <p:cBhvr>
                                         <p:cTn id="47" dur="500"/>
                                         <p:tgtEl>
-                                          <p:spTgt spid="322565"/>
+                                          <p:spTgt spid="30"/>
                                         </p:tgtEl>
                                       </p:cBhvr>
                                     </p:animEffect>
@@ -12402,7 +12120,7 @@
                                           </p:stCondLst>
                                         </p:cTn>
                                         <p:tgtEl>
-                                          <p:spTgt spid="322565"/>
+                                          <p:spTgt spid="30"/>
                                         </p:tgtEl>
                                         <p:attrNameLst>
                                           <p:attrName>style.visibility</p:attrName>
@@ -12425,7 +12143,7 @@
                                       <p:cBhvr>
                                         <p:cTn id="50" dur="500"/>
                                         <p:tgtEl>
-                                          <p:spTgt spid="322566"/>
+                                          <p:spTgt spid="31"/>
                                         </p:tgtEl>
                                       </p:cBhvr>
                                     </p:animEffect>
@@ -12437,7 +12155,7 @@
                                           </p:stCondLst>
                                         </p:cTn>
                                         <p:tgtEl>
-                                          <p:spTgt spid="322566"/>
+                                          <p:spTgt spid="31"/>
                                         </p:tgtEl>
                                         <p:attrNameLst>
                                           <p:attrName>style.visibility</p:attrName>
@@ -12460,7 +12178,7 @@
                                       <p:cBhvr>
                                         <p:cTn id="53" dur="500"/>
                                         <p:tgtEl>
-                                          <p:spTgt spid="322567"/>
+                                          <p:spTgt spid="32"/>
                                         </p:tgtEl>
                                       </p:cBhvr>
                                     </p:animEffect>
@@ -12472,7 +12190,7 @@
                                           </p:stCondLst>
                                         </p:cTn>
                                         <p:tgtEl>
-                                          <p:spTgt spid="322567"/>
+                                          <p:spTgt spid="32"/>
                                         </p:tgtEl>
                                         <p:attrNameLst>
                                           <p:attrName>style.visibility</p:attrName>
@@ -12495,7 +12213,7 @@
                                       <p:cBhvr>
                                         <p:cTn id="56" dur="500"/>
                                         <p:tgtEl>
-                                          <p:spTgt spid="322568"/>
+                                          <p:spTgt spid="33"/>
                                         </p:tgtEl>
                                       </p:cBhvr>
                                     </p:animEffect>
@@ -12507,7 +12225,7 @@
                                           </p:stCondLst>
                                         </p:cTn>
                                         <p:tgtEl>
-                                          <p:spTgt spid="322568"/>
+                                          <p:spTgt spid="33"/>
                                         </p:tgtEl>
                                         <p:attrNameLst>
                                           <p:attrName>style.visibility</p:attrName>
@@ -12530,7 +12248,7 @@
                                       <p:cBhvr>
                                         <p:cTn id="59" dur="500"/>
                                         <p:tgtEl>
-                                          <p:spTgt spid="322569"/>
+                                          <p:spTgt spid="34"/>
                                         </p:tgtEl>
                                       </p:cBhvr>
                                     </p:animEffect>
@@ -12542,7 +12260,7 @@
                                           </p:stCondLst>
                                         </p:cTn>
                                         <p:tgtEl>
-                                          <p:spTgt spid="322569"/>
+                                          <p:spTgt spid="34"/>
                                         </p:tgtEl>
                                         <p:attrNameLst>
                                           <p:attrName>style.visibility</p:attrName>
@@ -12565,7 +12283,7 @@
                                       <p:cBhvr>
                                         <p:cTn id="62" dur="500"/>
                                         <p:tgtEl>
-                                          <p:spTgt spid="322570"/>
+                                          <p:spTgt spid="35"/>
                                         </p:tgtEl>
                                       </p:cBhvr>
                                     </p:animEffect>
@@ -12577,7 +12295,7 @@
                                           </p:stCondLst>
                                         </p:cTn>
                                         <p:tgtEl>
-                                          <p:spTgt spid="322570"/>
+                                          <p:spTgt spid="35"/>
                                         </p:tgtEl>
                                         <p:attrNameLst>
                                           <p:attrName>style.visibility</p:attrName>
@@ -12590,283 +12308,24 @@
                                   </p:childTnLst>
                                 </p:cTn>
                               </p:par>
+                            </p:childTnLst>
+                          </p:cTn>
+                        </p:par>
+                        <p:par>
+                          <p:cTn id="64" fill="hold">
+                            <p:stCondLst>
+                              <p:cond delay="500"/>
+                            </p:stCondLst>
+                            <p:childTnLst>
                               <p:par>
-                                <p:cTn id="64" presetID="9" presetClass="exit" presetSubtype="0" fill="hold" grpId="1" nodeType="withEffect">
-                                  <p:stCondLst>
-                                    <p:cond delay="0"/>
-                                  </p:stCondLst>
-                                  <p:childTnLst>
-                                    <p:animEffect transition="out" filter="dissolve">
-                                      <p:cBhvr>
-                                        <p:cTn id="65" dur="500"/>
-                                        <p:tgtEl>
-                                          <p:spTgt spid="322571"/>
-                                        </p:tgtEl>
-                                      </p:cBhvr>
-                                    </p:animEffect>
-                                    <p:set>
-                                      <p:cBhvr>
-                                        <p:cTn id="66" dur="1" fill="hold">
-                                          <p:stCondLst>
-                                            <p:cond delay="499"/>
-                                          </p:stCondLst>
-                                        </p:cTn>
-                                        <p:tgtEl>
-                                          <p:spTgt spid="322571"/>
-                                        </p:tgtEl>
-                                        <p:attrNameLst>
-                                          <p:attrName>style.visibility</p:attrName>
-                                        </p:attrNameLst>
-                                      </p:cBhvr>
-                                      <p:to>
-                                        <p:strVal val="hidden"/>
-                                      </p:to>
-                                    </p:set>
-                                  </p:childTnLst>
-                                </p:cTn>
-                              </p:par>
-                              <p:par>
-                                <p:cTn id="67" presetID="9" presetClass="exit" presetSubtype="0" fill="hold" grpId="1" nodeType="withEffect">
-                                  <p:stCondLst>
-                                    <p:cond delay="0"/>
-                                  </p:stCondLst>
-                                  <p:childTnLst>
-                                    <p:animEffect transition="out" filter="dissolve">
-                                      <p:cBhvr>
-                                        <p:cTn id="68" dur="500"/>
-                                        <p:tgtEl>
-                                          <p:spTgt spid="322572"/>
-                                        </p:tgtEl>
-                                      </p:cBhvr>
-                                    </p:animEffect>
-                                    <p:set>
-                                      <p:cBhvr>
-                                        <p:cTn id="69" dur="1" fill="hold">
-                                          <p:stCondLst>
-                                            <p:cond delay="499"/>
-                                          </p:stCondLst>
-                                        </p:cTn>
-                                        <p:tgtEl>
-                                          <p:spTgt spid="322572"/>
-                                        </p:tgtEl>
-                                        <p:attrNameLst>
-                                          <p:attrName>style.visibility</p:attrName>
-                                        </p:attrNameLst>
-                                      </p:cBhvr>
-                                      <p:to>
-                                        <p:strVal val="hidden"/>
-                                      </p:to>
-                                    </p:set>
-                                  </p:childTnLst>
-                                </p:cTn>
-                              </p:par>
-                              <p:par>
-                                <p:cTn id="70" presetID="9" presetClass="exit" presetSubtype="0" fill="hold" grpId="1" nodeType="withEffect">
-                                  <p:stCondLst>
-                                    <p:cond delay="0"/>
-                                  </p:stCondLst>
-                                  <p:childTnLst>
-                                    <p:animEffect transition="out" filter="dissolve">
-                                      <p:cBhvr>
-                                        <p:cTn id="71" dur="500"/>
-                                        <p:tgtEl>
-                                          <p:spTgt spid="322573"/>
-                                        </p:tgtEl>
-                                      </p:cBhvr>
-                                    </p:animEffect>
-                                    <p:set>
-                                      <p:cBhvr>
-                                        <p:cTn id="72" dur="1" fill="hold">
-                                          <p:stCondLst>
-                                            <p:cond delay="499"/>
-                                          </p:stCondLst>
-                                        </p:cTn>
-                                        <p:tgtEl>
-                                          <p:spTgt spid="322573"/>
-                                        </p:tgtEl>
-                                        <p:attrNameLst>
-                                          <p:attrName>style.visibility</p:attrName>
-                                        </p:attrNameLst>
-                                      </p:cBhvr>
-                                      <p:to>
-                                        <p:strVal val="hidden"/>
-                                      </p:to>
-                                    </p:set>
-                                  </p:childTnLst>
-                                </p:cTn>
-                              </p:par>
-                              <p:par>
-                                <p:cTn id="73" presetID="9" presetClass="exit" presetSubtype="0" fill="hold" grpId="1" nodeType="withEffect">
-                                  <p:stCondLst>
-                                    <p:cond delay="0"/>
-                                  </p:stCondLst>
-                                  <p:childTnLst>
-                                    <p:animEffect transition="out" filter="dissolve">
-                                      <p:cBhvr>
-                                        <p:cTn id="74" dur="500"/>
-                                        <p:tgtEl>
-                                          <p:spTgt spid="322574"/>
-                                        </p:tgtEl>
-                                      </p:cBhvr>
-                                    </p:animEffect>
-                                    <p:set>
-                                      <p:cBhvr>
-                                        <p:cTn id="75" dur="1" fill="hold">
-                                          <p:stCondLst>
-                                            <p:cond delay="499"/>
-                                          </p:stCondLst>
-                                        </p:cTn>
-                                        <p:tgtEl>
-                                          <p:spTgt spid="322574"/>
-                                        </p:tgtEl>
-                                        <p:attrNameLst>
-                                          <p:attrName>style.visibility</p:attrName>
-                                        </p:attrNameLst>
-                                      </p:cBhvr>
-                                      <p:to>
-                                        <p:strVal val="hidden"/>
-                                      </p:to>
-                                    </p:set>
-                                  </p:childTnLst>
-                                </p:cTn>
-                              </p:par>
-                              <p:par>
-                                <p:cTn id="76" presetID="1" presetClass="entr" presetSubtype="0" fill="hold" grpId="0" nodeType="withEffect">
+                                <p:cTn id="65" presetID="22" presetClass="entr" presetSubtype="1" fill="hold" grpId="0" nodeType="afterEffect">
                                   <p:stCondLst>
                                     <p:cond delay="0"/>
                                   </p:stCondLst>
                                   <p:childTnLst>
                                     <p:set>
                                       <p:cBhvr>
-                                        <p:cTn id="77" dur="1" fill="hold">
-                                          <p:stCondLst>
-                                            <p:cond delay="0"/>
-                                          </p:stCondLst>
-                                        </p:cTn>
-                                        <p:tgtEl>
-                                          <p:spTgt spid="322564">
-                                            <p:txEl>
-                                              <p:pRg st="2" end="2"/>
-                                            </p:txEl>
-                                          </p:spTgt>
-                                        </p:tgtEl>
-                                        <p:attrNameLst>
-                                          <p:attrName>style.visibility</p:attrName>
-                                        </p:attrNameLst>
-                                      </p:cBhvr>
-                                      <p:to>
-                                        <p:strVal val="visible"/>
-                                      </p:to>
-                                    </p:set>
-                                  </p:childTnLst>
-                                </p:cTn>
-                              </p:par>
-                            </p:childTnLst>
-                          </p:cTn>
-                        </p:par>
-                        <p:par>
-                          <p:cTn id="78" fill="hold">
-                            <p:stCondLst>
-                              <p:cond delay="500"/>
-                            </p:stCondLst>
-                            <p:childTnLst>
-                              <p:par>
-                                <p:cTn id="79" presetID="22" presetClass="entr" presetSubtype="1" fill="hold" grpId="0" nodeType="afterEffect">
-                                  <p:stCondLst>
-                                    <p:cond delay="0"/>
-                                  </p:stCondLst>
-                                  <p:childTnLst>
-                                    <p:set>
-                                      <p:cBhvr>
-                                        <p:cTn id="80" dur="1" fill="hold">
-                                          <p:stCondLst>
-                                            <p:cond delay="0"/>
-                                          </p:stCondLst>
-                                        </p:cTn>
-                                        <p:tgtEl>
-                                          <p:spTgt spid="322575"/>
-                                        </p:tgtEl>
-                                        <p:attrNameLst>
-                                          <p:attrName>style.visibility</p:attrName>
-                                        </p:attrNameLst>
-                                      </p:cBhvr>
-                                      <p:to>
-                                        <p:strVal val="visible"/>
-                                      </p:to>
-                                    </p:set>
-                                    <p:animEffect transition="in" filter="wipe(up)">
-                                      <p:cBhvr>
-                                        <p:cTn id="81" dur="500"/>
-                                        <p:tgtEl>
-                                          <p:spTgt spid="322575"/>
-                                        </p:tgtEl>
-                                      </p:cBhvr>
-                                    </p:animEffect>
-                                  </p:childTnLst>
-                                </p:cTn>
-                              </p:par>
-                            </p:childTnLst>
-                          </p:cTn>
-                        </p:par>
-                        <p:par>
-                          <p:cTn id="82" fill="hold">
-                            <p:stCondLst>
-                              <p:cond delay="1000"/>
-                            </p:stCondLst>
-                            <p:childTnLst>
-                              <p:par>
-                                <p:cTn id="83" presetID="22" presetClass="entr" presetSubtype="1" fill="hold" grpId="0" nodeType="afterEffect">
-                                  <p:stCondLst>
-                                    <p:cond delay="0"/>
-                                  </p:stCondLst>
-                                  <p:childTnLst>
-                                    <p:set>
-                                      <p:cBhvr>
-                                        <p:cTn id="84" dur="1" fill="hold">
-                                          <p:stCondLst>
-                                            <p:cond delay="0"/>
-                                          </p:stCondLst>
-                                        </p:cTn>
-                                        <p:tgtEl>
-                                          <p:spTgt spid="322576"/>
-                                        </p:tgtEl>
-                                        <p:attrNameLst>
-                                          <p:attrName>style.visibility</p:attrName>
-                                        </p:attrNameLst>
-                                      </p:cBhvr>
-                                      <p:to>
-                                        <p:strVal val="visible"/>
-                                      </p:to>
-                                    </p:set>
-                                    <p:animEffect transition="in" filter="wipe(up)">
-                                      <p:cBhvr>
-                                        <p:cTn id="85" dur="500"/>
-                                        <p:tgtEl>
-                                          <p:spTgt spid="322576"/>
-                                        </p:tgtEl>
-                                      </p:cBhvr>
-                                    </p:animEffect>
-                                  </p:childTnLst>
-                                </p:cTn>
-                              </p:par>
-                            </p:childTnLst>
-                          </p:cTn>
-                        </p:par>
-                        <p:par>
-                          <p:cTn id="86" fill="hold">
-                            <p:stCondLst>
-                              <p:cond delay="1500"/>
-                            </p:stCondLst>
-                            <p:childTnLst>
-                              <p:par>
-                                <p:cTn id="87" presetID="22" presetClass="entr" presetSubtype="1" fill="hold" grpId="0" nodeType="afterEffect">
-                                  <p:stCondLst>
-                                    <p:cond delay="0"/>
-                                  </p:stCondLst>
-                                  <p:childTnLst>
-                                    <p:set>
-                                      <p:cBhvr>
-                                        <p:cTn id="88" dur="1" fill="hold">
+                                        <p:cTn id="66" dur="1" fill="hold">
                                           <p:stCondLst>
                                             <p:cond delay="0"/>
                                           </p:stCondLst>
@@ -12884,7 +12343,7 @@
                                     </p:set>
                                     <p:animEffect transition="in" filter="wipe(up)">
                                       <p:cBhvr>
-                                        <p:cTn id="89" dur="500"/>
+                                        <p:cTn id="67" dur="500"/>
                                         <p:tgtEl>
                                           <p:spTgt spid="322577"/>
                                         </p:tgtEl>
@@ -12897,26 +12356,26 @@
                           </p:cTn>
                         </p:par>
                         <p:par>
-                          <p:cTn id="90" fill="hold">
+                          <p:cTn id="68" fill="hold">
                             <p:stCondLst>
-                              <p:cond delay="2000"/>
+                              <p:cond delay="1000"/>
                             </p:stCondLst>
                             <p:childTnLst>
                               <p:par>
-                                <p:cTn id="91" presetID="22" presetClass="entr" presetSubtype="1" fill="hold" grpId="0" nodeType="afterEffect">
+                                <p:cTn id="69" presetID="22" presetClass="entr" presetSubtype="1" fill="hold" grpId="0" nodeType="afterEffect">
                                   <p:stCondLst>
                                     <p:cond delay="0"/>
                                   </p:stCondLst>
                                   <p:childTnLst>
                                     <p:set>
                                       <p:cBhvr>
-                                        <p:cTn id="92" dur="1" fill="hold">
+                                        <p:cTn id="70" dur="1" fill="hold">
                                           <p:stCondLst>
                                             <p:cond delay="0"/>
                                           </p:stCondLst>
                                         </p:cTn>
                                         <p:tgtEl>
-                                          <p:spTgt spid="322578"/>
+                                          <p:spTgt spid="36"/>
                                         </p:tgtEl>
                                         <p:attrNameLst>
                                           <p:attrName>style.visibility</p:attrName>
@@ -12928,9 +12387,9 @@
                                     </p:set>
                                     <p:animEffect transition="in" filter="wipe(up)">
                                       <p:cBhvr>
-                                        <p:cTn id="93" dur="500"/>
+                                        <p:cTn id="71" dur="500"/>
                                         <p:tgtEl>
-                                          <p:spTgt spid="322578"/>
+                                          <p:spTgt spid="36"/>
                                         </p:tgtEl>
                                       </p:cBhvr>
                                     </p:animEffect>
@@ -12941,26 +12400,26 @@
                           </p:cTn>
                         </p:par>
                         <p:par>
-                          <p:cTn id="94" fill="hold">
+                          <p:cTn id="72" fill="hold">
                             <p:stCondLst>
-                              <p:cond delay="2500"/>
+                              <p:cond delay="1500"/>
                             </p:stCondLst>
                             <p:childTnLst>
                               <p:par>
-                                <p:cTn id="95" presetID="22" presetClass="entr" presetSubtype="1" fill="hold" grpId="0" nodeType="afterEffect">
+                                <p:cTn id="73" presetID="22" presetClass="entr" presetSubtype="1" fill="hold" grpId="0" nodeType="afterEffect">
                                   <p:stCondLst>
                                     <p:cond delay="0"/>
                                   </p:stCondLst>
                                   <p:childTnLst>
                                     <p:set>
                                       <p:cBhvr>
-                                        <p:cTn id="96" dur="1" fill="hold">
+                                        <p:cTn id="74" dur="1" fill="hold">
                                           <p:stCondLst>
                                             <p:cond delay="0"/>
                                           </p:stCondLst>
                                         </p:cTn>
                                         <p:tgtEl>
-                                          <p:spTgt spid="322579"/>
+                                          <p:spTgt spid="37"/>
                                         </p:tgtEl>
                                         <p:attrNameLst>
                                           <p:attrName>style.visibility</p:attrName>
@@ -12972,9 +12431,9 @@
                                     </p:set>
                                     <p:animEffect transition="in" filter="wipe(up)">
                                       <p:cBhvr>
-                                        <p:cTn id="97" dur="500"/>
+                                        <p:cTn id="75" dur="500"/>
                                         <p:tgtEl>
-                                          <p:spTgt spid="322579"/>
+                                          <p:spTgt spid="37"/>
                                         </p:tgtEl>
                                       </p:cBhvr>
                                     </p:animEffect>
@@ -12985,26 +12444,26 @@
                           </p:cTn>
                         </p:par>
                         <p:par>
-                          <p:cTn id="98" fill="hold">
+                          <p:cTn id="76" fill="hold">
                             <p:stCondLst>
-                              <p:cond delay="3000"/>
+                              <p:cond delay="2000"/>
                             </p:stCondLst>
                             <p:childTnLst>
                               <p:par>
-                                <p:cTn id="99" presetID="22" presetClass="entr" presetSubtype="1" fill="hold" grpId="0" nodeType="afterEffect">
+                                <p:cTn id="77" presetID="22" presetClass="entr" presetSubtype="1" fill="hold" grpId="0" nodeType="afterEffect">
                                   <p:stCondLst>
                                     <p:cond delay="0"/>
                                   </p:stCondLst>
                                   <p:childTnLst>
                                     <p:set>
                                       <p:cBhvr>
-                                        <p:cTn id="100" dur="1" fill="hold">
+                                        <p:cTn id="78" dur="1" fill="hold">
                                           <p:stCondLst>
                                             <p:cond delay="0"/>
                                           </p:stCondLst>
                                         </p:cTn>
                                         <p:tgtEl>
-                                          <p:spTgt spid="322580"/>
+                                          <p:spTgt spid="39"/>
                                         </p:tgtEl>
                                         <p:attrNameLst>
                                           <p:attrName>style.visibility</p:attrName>
@@ -13016,9 +12475,9 @@
                                     </p:set>
                                     <p:animEffect transition="in" filter="wipe(up)">
                                       <p:cBhvr>
-                                        <p:cTn id="101" dur="500"/>
+                                        <p:cTn id="79" dur="500"/>
                                         <p:tgtEl>
-                                          <p:spTgt spid="322580"/>
+                                          <p:spTgt spid="39"/>
                                         </p:tgtEl>
                                       </p:cBhvr>
                                     </p:animEffect>
@@ -13029,26 +12488,26 @@
                           </p:cTn>
                         </p:par>
                         <p:par>
-                          <p:cTn id="102" fill="hold">
+                          <p:cTn id="80" fill="hold">
                             <p:stCondLst>
-                              <p:cond delay="3500"/>
+                              <p:cond delay="2500"/>
                             </p:stCondLst>
                             <p:childTnLst>
                               <p:par>
-                                <p:cTn id="103" presetID="22" presetClass="entr" presetSubtype="1" fill="hold" grpId="0" nodeType="afterEffect">
+                                <p:cTn id="81" presetID="22" presetClass="entr" presetSubtype="1" fill="hold" grpId="0" nodeType="afterEffect">
                                   <p:stCondLst>
                                     <p:cond delay="0"/>
                                   </p:stCondLst>
                                   <p:childTnLst>
                                     <p:set>
                                       <p:cBhvr>
-                                        <p:cTn id="104" dur="1" fill="hold">
+                                        <p:cTn id="82" dur="1" fill="hold">
                                           <p:stCondLst>
                                             <p:cond delay="0"/>
                                           </p:stCondLst>
                                         </p:cTn>
                                         <p:tgtEl>
-                                          <p:spTgt spid="322581"/>
+                                          <p:spTgt spid="38"/>
                                         </p:tgtEl>
                                         <p:attrNameLst>
                                           <p:attrName>style.visibility</p:attrName>
@@ -13060,9 +12519,9 @@
                                     </p:set>
                                     <p:animEffect transition="in" filter="wipe(up)">
                                       <p:cBhvr>
-                                        <p:cTn id="105" dur="500"/>
+                                        <p:cTn id="83" dur="500"/>
                                         <p:tgtEl>
-                                          <p:spTgt spid="322581"/>
+                                          <p:spTgt spid="38"/>
                                         </p:tgtEl>
                                       </p:cBhvr>
                                     </p:animEffect>
@@ -13073,26 +12532,26 @@
                           </p:cTn>
                         </p:par>
                         <p:par>
-                          <p:cTn id="106" fill="hold">
+                          <p:cTn id="84" fill="hold">
                             <p:stCondLst>
-                              <p:cond delay="4000"/>
+                              <p:cond delay="3000"/>
                             </p:stCondLst>
                             <p:childTnLst>
                               <p:par>
-                                <p:cTn id="107" presetID="22" presetClass="entr" presetSubtype="1" fill="hold" grpId="0" nodeType="afterEffect">
+                                <p:cTn id="85" presetID="22" presetClass="entr" presetSubtype="4" fill="hold" grpId="0" nodeType="afterEffect">
                                   <p:stCondLst>
                                     <p:cond delay="0"/>
                                   </p:stCondLst>
                                   <p:childTnLst>
                                     <p:set>
                                       <p:cBhvr>
-                                        <p:cTn id="108" dur="1" fill="hold">
+                                        <p:cTn id="86" dur="1" fill="hold">
                                           <p:stCondLst>
                                             <p:cond delay="0"/>
                                           </p:stCondLst>
                                         </p:cTn>
                                         <p:tgtEl>
-                                          <p:spTgt spid="322582"/>
+                                          <p:spTgt spid="40"/>
                                         </p:tgtEl>
                                         <p:attrNameLst>
                                           <p:attrName>style.visibility</p:attrName>
@@ -13102,11 +12561,11 @@
                                         <p:strVal val="visible"/>
                                       </p:to>
                                     </p:set>
-                                    <p:animEffect transition="in" filter="wipe(up)">
+                                    <p:animEffect transition="in" filter="wipe(down)">
                                       <p:cBhvr>
-                                        <p:cTn id="109" dur="500"/>
+                                        <p:cTn id="87" dur="500"/>
                                         <p:tgtEl>
-                                          <p:spTgt spid="322582"/>
+                                          <p:spTgt spid="40"/>
                                         </p:tgtEl>
                                       </p:cBhvr>
                                     </p:animEffect>
@@ -13117,26 +12576,26 @@
                           </p:cTn>
                         </p:par>
                         <p:par>
-                          <p:cTn id="110" fill="hold">
+                          <p:cTn id="88" fill="hold">
                             <p:stCondLst>
-                              <p:cond delay="4500"/>
+                              <p:cond delay="3500"/>
                             </p:stCondLst>
                             <p:childTnLst>
                               <p:par>
-                                <p:cTn id="111" presetID="22" presetClass="entr" presetSubtype="1" fill="hold" grpId="0" nodeType="afterEffect">
+                                <p:cTn id="89" presetID="22" presetClass="entr" presetSubtype="4" fill="hold" grpId="0" nodeType="afterEffect">
                                   <p:stCondLst>
                                     <p:cond delay="0"/>
                                   </p:stCondLst>
                                   <p:childTnLst>
                                     <p:set>
                                       <p:cBhvr>
-                                        <p:cTn id="112" dur="1" fill="hold">
+                                        <p:cTn id="90" dur="1" fill="hold">
                                           <p:stCondLst>
                                             <p:cond delay="0"/>
                                           </p:stCondLst>
                                         </p:cTn>
                                         <p:tgtEl>
-                                          <p:spTgt spid="322583"/>
+                                          <p:spTgt spid="41"/>
                                         </p:tgtEl>
                                         <p:attrNameLst>
                                           <p:attrName>style.visibility</p:attrName>
@@ -13146,11 +12605,11 @@
                                         <p:strVal val="visible"/>
                                       </p:to>
                                     </p:set>
-                                    <p:animEffect transition="in" filter="wipe(up)">
+                                    <p:animEffect transition="in" filter="wipe(down)">
                                       <p:cBhvr>
-                                        <p:cTn id="113" dur="500"/>
+                                        <p:cTn id="91" dur="500"/>
                                         <p:tgtEl>
-                                          <p:spTgt spid="322583"/>
+                                          <p:spTgt spid="41"/>
                                         </p:tgtEl>
                                       </p:cBhvr>
                                     </p:animEffect>
@@ -13161,26 +12620,26 @@
                           </p:cTn>
                         </p:par>
                         <p:par>
-                          <p:cTn id="114" fill="hold">
+                          <p:cTn id="92" fill="hold">
                             <p:stCondLst>
-                              <p:cond delay="5000"/>
+                              <p:cond delay="4000"/>
                             </p:stCondLst>
                             <p:childTnLst>
                               <p:par>
-                                <p:cTn id="115" presetID="22" presetClass="entr" presetSubtype="1" fill="hold" grpId="0" nodeType="afterEffect">
+                                <p:cTn id="93" presetID="22" presetClass="entr" presetSubtype="4" fill="hold" grpId="0" nodeType="afterEffect">
                                   <p:stCondLst>
                                     <p:cond delay="0"/>
                                   </p:stCondLst>
                                   <p:childTnLst>
                                     <p:set>
                                       <p:cBhvr>
-                                        <p:cTn id="116" dur="1" fill="hold">
+                                        <p:cTn id="94" dur="1" fill="hold">
                                           <p:stCondLst>
                                             <p:cond delay="0"/>
                                           </p:stCondLst>
                                         </p:cTn>
                                         <p:tgtEl>
-                                          <p:spTgt spid="322584"/>
+                                          <p:spTgt spid="42"/>
                                         </p:tgtEl>
                                         <p:attrNameLst>
                                           <p:attrName>style.visibility</p:attrName>
@@ -13190,11 +12649,11 @@
                                         <p:strVal val="visible"/>
                                       </p:to>
                                     </p:set>
-                                    <p:animEffect transition="in" filter="wipe(up)">
+                                    <p:animEffect transition="in" filter="wipe(down)">
                                       <p:cBhvr>
-                                        <p:cTn id="117" dur="500"/>
+                                        <p:cTn id="95" dur="500"/>
                                         <p:tgtEl>
-                                          <p:spTgt spid="322584"/>
+                                          <p:spTgt spid="42"/>
                                         </p:tgtEl>
                                       </p:cBhvr>
                                     </p:animEffect>
@@ -13205,26 +12664,26 @@
                           </p:cTn>
                         </p:par>
                         <p:par>
-                          <p:cTn id="118" fill="hold">
+                          <p:cTn id="96" fill="hold">
                             <p:stCondLst>
-                              <p:cond delay="5500"/>
+                              <p:cond delay="4500"/>
                             </p:stCondLst>
                             <p:childTnLst>
                               <p:par>
-                                <p:cTn id="119" presetID="22" presetClass="entr" presetSubtype="1" fill="hold" grpId="0" nodeType="afterEffect">
+                                <p:cTn id="97" presetID="22" presetClass="entr" presetSubtype="4" fill="hold" grpId="0" nodeType="afterEffect">
                                   <p:stCondLst>
                                     <p:cond delay="0"/>
                                   </p:stCondLst>
                                   <p:childTnLst>
                                     <p:set>
                                       <p:cBhvr>
-                                        <p:cTn id="120" dur="1" fill="hold">
+                                        <p:cTn id="98" dur="1" fill="hold">
                                           <p:stCondLst>
                                             <p:cond delay="0"/>
                                           </p:stCondLst>
                                         </p:cTn>
                                         <p:tgtEl>
-                                          <p:spTgt spid="322585"/>
+                                          <p:spTgt spid="43"/>
                                         </p:tgtEl>
                                         <p:attrNameLst>
                                           <p:attrName>style.visibility</p:attrName>
@@ -13234,11 +12693,55 @@
                                         <p:strVal val="visible"/>
                                       </p:to>
                                     </p:set>
-                                    <p:animEffect transition="in" filter="wipe(up)">
+                                    <p:animEffect transition="in" filter="wipe(down)">
                                       <p:cBhvr>
-                                        <p:cTn id="121" dur="500"/>
+                                        <p:cTn id="99" dur="500"/>
                                         <p:tgtEl>
-                                          <p:spTgt spid="322585"/>
+                                          <p:spTgt spid="43"/>
+                                        </p:tgtEl>
+                                      </p:cBhvr>
+                                    </p:animEffect>
+                                  </p:childTnLst>
+                                </p:cTn>
+                              </p:par>
+                            </p:childTnLst>
+                          </p:cTn>
+                        </p:par>
+                        <p:par>
+                          <p:cTn id="100" fill="hold">
+                            <p:stCondLst>
+                              <p:cond delay="5000"/>
+                            </p:stCondLst>
+                            <p:childTnLst>
+                              <p:par>
+                                <p:cTn id="101" presetID="22" presetClass="entr" presetSubtype="4" fill="hold" grpId="0" nodeType="afterEffect">
+                                  <p:stCondLst>
+                                    <p:cond delay="0"/>
+                                  </p:stCondLst>
+                                  <p:childTnLst>
+                                    <p:set>
+                                      <p:cBhvr>
+                                        <p:cTn id="102" dur="1" fill="hold">
+                                          <p:stCondLst>
+                                            <p:cond delay="0"/>
+                                          </p:stCondLst>
+                                        </p:cTn>
+                                        <p:tgtEl>
+                                          <p:spTgt spid="44"/>
+                                        </p:tgtEl>
+                                        <p:attrNameLst>
+                                          <p:attrName>style.visibility</p:attrName>
+                                        </p:attrNameLst>
+                                      </p:cBhvr>
+                                      <p:to>
+                                        <p:strVal val="visible"/>
+                                      </p:to>
+                                    </p:set>
+                                    <p:animEffect transition="in" filter="wipe(down)">
+                                      <p:cBhvr>
+                                        <p:cTn id="103" dur="500"/>
+                                        <p:tgtEl>
+                                          <p:spTgt spid="44"/>
                                         </p:tgtEl>
                                       </p:cBhvr>
                                     </p:animEffect>
@@ -13274,37 +12777,32 @@
     </p:tnLst>
     <p:bldLst>
       <p:bldP spid="322564" grpId="0" uiExpand="1" build="p"/>
-      <p:bldP spid="322565" grpId="0" animBg="1"/>
-      <p:bldP spid="322565" grpId="1" animBg="1"/>
-      <p:bldP spid="322566" grpId="0" animBg="1"/>
-      <p:bldP spid="322566" grpId="1" animBg="1"/>
-      <p:bldP spid="322567" grpId="0" animBg="1"/>
-      <p:bldP spid="322567" grpId="1" animBg="1"/>
-      <p:bldP spid="322568" grpId="0" animBg="1"/>
-      <p:bldP spid="322568" grpId="1" animBg="1"/>
-      <p:bldP spid="322569" grpId="0" animBg="1"/>
-      <p:bldP spid="322569" grpId="1" animBg="1"/>
-      <p:bldP spid="322570" grpId="0" animBg="1"/>
-      <p:bldP spid="322570" grpId="1" animBg="1"/>
-      <p:bldP spid="322571" grpId="0" animBg="1"/>
-      <p:bldP spid="322571" grpId="1" animBg="1"/>
-      <p:bldP spid="322572" grpId="0" animBg="1"/>
-      <p:bldP spid="322572" grpId="1" animBg="1"/>
       <p:bldP spid="322573" grpId="0" animBg="1"/>
       <p:bldP spid="322573" grpId="1" animBg="1"/>
-      <p:bldP spid="322574" grpId="0" animBg="1"/>
-      <p:bldP spid="322574" grpId="1" animBg="1"/>
-      <p:bldP spid="322575" grpId="0" animBg="1"/>
-      <p:bldP spid="322576" grpId="0" animBg="1"/>
       <p:bldP spid="322577" grpId="0" animBg="1"/>
-      <p:bldP spid="322578" grpId="0" animBg="1"/>
-      <p:bldP spid="322579" grpId="0" animBg="1"/>
-      <p:bldP spid="322580" grpId="0" animBg="1"/>
-      <p:bldP spid="322581" grpId="0" animBg="1"/>
-      <p:bldP spid="322582" grpId="0" animBg="1"/>
-      <p:bldP spid="322583" grpId="0" animBg="1"/>
-      <p:bldP spid="322584" grpId="0" animBg="1"/>
-      <p:bldP spid="322585" grpId="0" animBg="1"/>
+      <p:bldP spid="29" grpId="0" animBg="1"/>
+      <p:bldP spid="29" grpId="1" animBg="1"/>
+      <p:bldP spid="30" grpId="0" animBg="1"/>
+      <p:bldP spid="30" grpId="1" animBg="1"/>
+      <p:bldP spid="31" grpId="0" animBg="1"/>
+      <p:bldP spid="31" grpId="1" animBg="1"/>
+      <p:bldP spid="32" grpId="0" animBg="1"/>
+      <p:bldP spid="32" grpId="1" animBg="1"/>
+      <p:bldP spid="33" grpId="0" animBg="1"/>
+      <p:bldP spid="33" grpId="1" animBg="1"/>
+      <p:bldP spid="34" grpId="0" animBg="1"/>
+      <p:bldP spid="34" grpId="1" animBg="1"/>
+      <p:bldP spid="35" grpId="0" animBg="1"/>
+      <p:bldP spid="35" grpId="1" animBg="1"/>
+      <p:bldP spid="36" grpId="0" animBg="1"/>
+      <p:bldP spid="37" grpId="0" animBg="1"/>
+      <p:bldP spid="38" grpId="0" animBg="1"/>
+      <p:bldP spid="39" grpId="0" animBg="1"/>
+      <p:bldP spid="40" grpId="0" animBg="1"/>
+      <p:bldP spid="41" grpId="0" animBg="1"/>
+      <p:bldP spid="42" grpId="0" animBg="1"/>
+      <p:bldP spid="43" grpId="0" animBg="1"/>
+      <p:bldP spid="44" grpId="0" animBg="1"/>
     </p:bldLst>
   </p:timing>
 </p:sld>
@@ -20154,7 +19652,6 @@
               <a:rPr lang="en-US" sz="3000" dirty="0" smtClean="0"/>
               <a:t>Linearity</a:t>
             </a:r>
-            <a:endParaRPr lang="en-US" sz="3000" dirty="0" smtClean="0"/>
           </a:p>
         </p:txBody>
       </p:sp>
@@ -20357,9 +19854,14 @@
           <a:lstStyle/>
           <a:p>
             <a:r>
-              <a:rPr lang="en-US"/>
-              <a:t>Example – Atlantic Salmon</a:t>
-            </a:r>
+              <a:rPr lang="en-US" dirty="0"/>
+              <a:t>Example – </a:t>
+            </a:r>
+            <a:r>
+              <a:rPr lang="en-US" dirty="0" smtClean="0"/>
+              <a:t>Oak Gall Wasps</a:t>
+            </a:r>
+            <a:endParaRPr lang="en-US" dirty="0"/>
           </a:p>
         </p:txBody>
       </p:sp>
@@ -20375,8 +19877,8 @@
         </p:nvSpPr>
         <p:spPr>
           <a:xfrm>
-            <a:off x="152400" y="914400"/>
-            <a:ext cx="8839200" cy="2895600"/>
+            <a:off x="152400" y="1600200"/>
+            <a:ext cx="8839200" cy="762000"/>
           </a:xfrm>
         </p:spPr>
         <p:txBody>
@@ -20384,73 +19886,10 @@
           <a:lstStyle/>
           <a:p>
             <a:r>
-              <a:rPr lang="en-US" sz="3000" dirty="0" err="1"/>
-              <a:t>Vladic</a:t>
-            </a:r>
-            <a:r>
-              <a:rPr lang="en-US" sz="3000" dirty="0"/>
-              <a:t> </a:t>
-            </a:r>
-            <a:r>
-              <a:rPr lang="en-US" sz="3000" i="1" dirty="0"/>
-              <a:t>et al.</a:t>
-            </a:r>
-            <a:r>
-              <a:rPr lang="en-US" sz="3000" dirty="0"/>
-              <a:t> (2002) recorded </a:t>
-            </a:r>
-            <a:r>
-              <a:rPr lang="en-US" sz="2600" dirty="0"/>
-              <a:t>(in SalmonSperm.txt)</a:t>
-            </a:r>
-          </a:p>
-          <a:p>
-            <a:pPr lvl="1"/>
-            <a:r>
-              <a:rPr lang="en-US" sz="2600" dirty="0"/>
-              <a:t>probability of successful egg fertilization (</a:t>
-            </a:r>
-            <a:r>
-              <a:rPr lang="en-US" sz="2600" dirty="0" err="1">
-                <a:solidFill>
-                  <a:schemeClr val="accent2"/>
-                </a:solidFill>
-              </a:rPr>
-              <a:t>fert.success</a:t>
-            </a:r>
-            <a:r>
-              <a:rPr lang="en-US" sz="2600" dirty="0"/>
-              <a:t>)</a:t>
-            </a:r>
-          </a:p>
-          <a:p>
-            <a:pPr lvl="1"/>
-            <a:r>
-              <a:rPr lang="en-US" sz="2600" dirty="0"/>
-              <a:t>the length of sperm tail end piece (</a:t>
-            </a:r>
-            <a:r>
-              <a:rPr lang="en-US" sz="2600" dirty="0" err="1">
-                <a:solidFill>
-                  <a:schemeClr val="accent2"/>
-                </a:solidFill>
-              </a:rPr>
-              <a:t>step.len</a:t>
-            </a:r>
-            <a:r>
-              <a:rPr lang="en-US" sz="2600" dirty="0"/>
-              <a:t>)</a:t>
-            </a:r>
-          </a:p>
-          <a:p>
-            <a:pPr lvl="1"/>
-            <a:endParaRPr lang="en-US" sz="1400" dirty="0"/>
-          </a:p>
-          <a:p>
-            <a:r>
-              <a:rPr lang="en-US" sz="3000" dirty="0"/>
-              <a:t>Asked “Are fertilization success and length of sperm related?”</a:t>
-            </a:r>
+              <a:rPr lang="en-US" sz="3000" dirty="0" smtClean="0"/>
+              <a:t>See HO Background</a:t>
+            </a:r>
+            <a:endParaRPr lang="en-US" sz="3000" dirty="0"/>
           </a:p>
         </p:txBody>
       </p:sp>
@@ -20486,39 +19925,6 @@
           </a:p>
         </p:txBody>
       </p:sp>
-      <p:pic>
-        <p:nvPicPr>
-          <p:cNvPr id="306180" name="Picture 4"/>
-          <p:cNvPicPr>
-            <a:picLocks noChangeAspect="1" noChangeArrowheads="1"/>
-          </p:cNvPicPr>
-          <p:nvPr/>
-        </p:nvPicPr>
-        <p:blipFill>
-          <a:blip r:embed="rId2"/>
-          <a:srcRect/>
-          <a:stretch>
-            <a:fillRect/>
-          </a:stretch>
-        </p:blipFill>
-        <p:spPr bwMode="auto">
-          <a:xfrm>
-            <a:off x="4495800" y="3122613"/>
-            <a:ext cx="3803650" cy="3786187"/>
-          </a:xfrm>
-          <a:prstGeom prst="rect">
-            <a:avLst/>
-          </a:prstGeom>
-          <a:noFill/>
-          <a:ln w="9525">
-            <a:noFill/>
-            <a:miter lim="800000"/>
-            <a:headEnd/>
-            <a:tailEnd/>
-          </a:ln>
-          <a:effectLst/>
-        </p:spPr>
-      </p:pic>
     </p:spTree>
   </p:cSld>
   <p:clrMapOvr>
@@ -20527,128 +19933,9 @@
   <p:timing>
     <p:tnLst>
       <p:par>
-        <p:cTn id="1" dur="indefinite" restart="never" nodeType="tmRoot">
-          <p:childTnLst>
-            <p:seq concurrent="1" nextAc="seek">
-              <p:cTn id="2" dur="indefinite" nodeType="mainSeq">
-                <p:childTnLst>
-                  <p:par>
-                    <p:cTn id="3" fill="hold">
-                      <p:stCondLst>
-                        <p:cond delay="indefinite"/>
-                      </p:stCondLst>
-                      <p:childTnLst>
-                        <p:par>
-                          <p:cTn id="4" fill="hold">
-                            <p:stCondLst>
-                              <p:cond delay="0"/>
-                            </p:stCondLst>
-                            <p:childTnLst>
-                              <p:par>
-                                <p:cTn id="5" presetID="1" presetClass="entr" presetSubtype="0" fill="hold" grpId="0" nodeType="clickEffect">
-                                  <p:stCondLst>
-                                    <p:cond delay="0"/>
-                                  </p:stCondLst>
-                                  <p:childTnLst>
-                                    <p:set>
-                                      <p:cBhvr>
-                                        <p:cTn id="6" dur="1" fill="hold">
-                                          <p:stCondLst>
-                                            <p:cond delay="0"/>
-                                          </p:stCondLst>
-                                        </p:cTn>
-                                        <p:tgtEl>
-                                          <p:spTgt spid="306179">
-                                            <p:txEl>
-                                              <p:pRg st="4" end="4"/>
-                                            </p:txEl>
-                                          </p:spTgt>
-                                        </p:tgtEl>
-                                        <p:attrNameLst>
-                                          <p:attrName>style.visibility</p:attrName>
-                                        </p:attrNameLst>
-                                      </p:cBhvr>
-                                      <p:to>
-                                        <p:strVal val="visible"/>
-                                      </p:to>
-                                    </p:set>
-                                  </p:childTnLst>
-                                </p:cTn>
-                              </p:par>
-                            </p:childTnLst>
-                          </p:cTn>
-                        </p:par>
-                        <p:par>
-                          <p:cTn id="7" fill="hold">
-                            <p:stCondLst>
-                              <p:cond delay="0"/>
-                            </p:stCondLst>
-                            <p:childTnLst>
-                              <p:par>
-                                <p:cTn id="8" presetID="9" presetClass="entr" presetSubtype="0" fill="hold" nodeType="afterEffect">
-                                  <p:stCondLst>
-                                    <p:cond delay="0"/>
-                                  </p:stCondLst>
-                                  <p:childTnLst>
-                                    <p:set>
-                                      <p:cBhvr>
-                                        <p:cTn id="9" dur="1" fill="hold">
-                                          <p:stCondLst>
-                                            <p:cond delay="0"/>
-                                          </p:stCondLst>
-                                        </p:cTn>
-                                        <p:tgtEl>
-                                          <p:spTgt spid="306180"/>
-                                        </p:tgtEl>
-                                        <p:attrNameLst>
-                                          <p:attrName>style.visibility</p:attrName>
-                                        </p:attrNameLst>
-                                      </p:cBhvr>
-                                      <p:to>
-                                        <p:strVal val="visible"/>
-                                      </p:to>
-                                    </p:set>
-                                    <p:animEffect transition="in" filter="dissolve">
-                                      <p:cBhvr>
-                                        <p:cTn id="10" dur="500"/>
-                                        <p:tgtEl>
-                                          <p:spTgt spid="306180"/>
-                                        </p:tgtEl>
-                                      </p:cBhvr>
-                                    </p:animEffect>
-                                  </p:childTnLst>
-                                </p:cTn>
-                              </p:par>
-                            </p:childTnLst>
-                          </p:cTn>
-                        </p:par>
-                      </p:childTnLst>
-                    </p:cTn>
-                  </p:par>
-                </p:childTnLst>
-              </p:cTn>
-              <p:prevCondLst>
-                <p:cond evt="onPrev" delay="0">
-                  <p:tgtEl>
-                    <p:sldTgt/>
-                  </p:tgtEl>
-                </p:cond>
-              </p:prevCondLst>
-              <p:nextCondLst>
-                <p:cond evt="onNext" delay="0">
-                  <p:tgtEl>
-                    <p:sldTgt/>
-                  </p:tgtEl>
-                </p:cond>
-              </p:nextCondLst>
-            </p:seq>
-          </p:childTnLst>
-        </p:cTn>
+        <p:cTn id="1" dur="indefinite" restart="never" nodeType="tmRoot"/>
       </p:par>
     </p:tnLst>
-    <p:bldLst>
-      <p:bldP spid="306179" grpId="0" uiExpand="1" build="p"/>
-    </p:bldLst>
   </p:timing>
 </p:sld>
 </file>
@@ -20830,13 +20117,10 @@
               <a:t>Predict @ </a:t>
             </a:r>
             <a:r>
-              <a:rPr lang="en-US" dirty="0" err="1"/>
-              <a:t>step.len</a:t>
-            </a:r>
-            <a:r>
-              <a:rPr lang="en-US" dirty="0"/>
-              <a:t>=3.5</a:t>
-            </a:r>
+              <a:rPr lang="en-US" dirty="0" smtClean="0"/>
+              <a:t>damage=35</a:t>
+            </a:r>
+            <a:endParaRPr lang="en-US" dirty="0"/>
           </a:p>
           <a:p>
             <a:pPr>
@@ -21594,6 +20878,30 @@
           <a:chExt cx="0" cy="0"/>
         </a:xfrm>
       </p:grpSpPr>
+      <p:pic>
+        <p:nvPicPr>
+          <p:cNvPr id="312408" name="Picture 312407"/>
+          <p:cNvPicPr>
+            <a:picLocks noChangeAspect="1"/>
+          </p:cNvPicPr>
+          <p:nvPr/>
+        </p:nvPicPr>
+        <p:blipFill>
+          <a:blip r:embed="rId2"/>
+          <a:stretch>
+            <a:fillRect/>
+          </a:stretch>
+        </p:blipFill>
+        <p:spPr>
+          <a:xfrm>
+            <a:off x="6019800" y="1524000"/>
+            <a:ext cx="3124200" cy="3124200"/>
+          </a:xfrm>
+          <a:prstGeom prst="rect">
+            <a:avLst/>
+          </a:prstGeom>
+        </p:spPr>
+      </p:pic>
       <p:sp>
         <p:nvSpPr>
           <p:cNvPr id="9" name="Footer Placeholder 3"/>
@@ -21712,7 +21020,7 @@
           <p:nvPr/>
         </p:nvPicPr>
         <p:blipFill>
-          <a:blip r:embed="rId2"/>
+          <a:blip r:embed="rId3"/>
           <a:srcRect/>
           <a:stretch>
             <a:fillRect/>
@@ -21815,7 +21123,7 @@
         </p:nvSpPr>
         <p:spPr bwMode="auto">
           <a:xfrm rot="5400000">
-            <a:off x="7419975" y="2867025"/>
+            <a:off x="7648575" y="2723864"/>
             <a:ext cx="552450" cy="457200"/>
           </a:xfrm>
           <a:prstGeom prst="leftRightArrow">
@@ -21845,39 +21153,6 @@
           </a:p>
         </p:txBody>
       </p:sp>
-      <p:pic>
-        <p:nvPicPr>
-          <p:cNvPr id="312329" name="Picture 9"/>
-          <p:cNvPicPr>
-            <a:picLocks noChangeAspect="1" noChangeArrowheads="1"/>
-          </p:cNvPicPr>
-          <p:nvPr/>
-        </p:nvPicPr>
-        <p:blipFill>
-          <a:blip r:embed="rId3"/>
-          <a:srcRect/>
-          <a:stretch>
-            <a:fillRect/>
-          </a:stretch>
-        </p:blipFill>
-        <p:spPr bwMode="auto">
-          <a:xfrm>
-            <a:off x="5486400" y="1544638"/>
-            <a:ext cx="3733800" cy="3717925"/>
-          </a:xfrm>
-          <a:prstGeom prst="rect">
-            <a:avLst/>
-          </a:prstGeom>
-          <a:noFill/>
-          <a:ln w="9525">
-            <a:noFill/>
-            <a:miter lim="800000"/>
-            <a:headEnd/>
-            <a:tailEnd/>
-          </a:ln>
-          <a:effectLst/>
-        </p:spPr>
-      </p:pic>
     </p:spTree>
   </p:cSld>
   <p:clrMapOvr>

</xml_diff>